<commit_message>
Intel PT info + some docs added
</commit_message>
<xml_diff>
--- a/Belikov_Virtual_machine_fuzzing_types_and_approaches.pptx
+++ b/Belikov_Virtual_machine_fuzzing_types_and_approaches.pptx
@@ -5,20 +5,25 @@
     <p:sldMasterId id="2147483648" r:id="rId1"/>
   </p:sldMasterIdLst>
   <p:notesMasterIdLst>
-    <p:notesMasterId r:id="rId10"/>
+    <p:notesMasterId r:id="rId15"/>
   </p:notesMasterIdLst>
   <p:handoutMasterIdLst>
-    <p:handoutMasterId r:id="rId11"/>
+    <p:handoutMasterId r:id="rId16"/>
   </p:handoutMasterIdLst>
   <p:sldIdLst>
     <p:sldId id="256" r:id="rId2"/>
     <p:sldId id="286" r:id="rId3"/>
     <p:sldId id="336" r:id="rId4"/>
     <p:sldId id="340" r:id="rId5"/>
-    <p:sldId id="339" r:id="rId6"/>
-    <p:sldId id="338" r:id="rId7"/>
-    <p:sldId id="337" r:id="rId8"/>
-    <p:sldId id="260" r:id="rId9"/>
+    <p:sldId id="341" r:id="rId6"/>
+    <p:sldId id="343" r:id="rId7"/>
+    <p:sldId id="342" r:id="rId8"/>
+    <p:sldId id="345" r:id="rId9"/>
+    <p:sldId id="344" r:id="rId10"/>
+    <p:sldId id="339" r:id="rId11"/>
+    <p:sldId id="338" r:id="rId12"/>
+    <p:sldId id="337" r:id="rId13"/>
+    <p:sldId id="260" r:id="rId14"/>
   </p:sldIdLst>
   <p:sldSz cx="12192000" cy="6858000"/>
   <p:notesSz cx="6858000" cy="9144000"/>
@@ -15503,6 +15508,622 @@
 </p:sld>
 </file>
 
+<file path=ppt/slides/slide10.xml><?xml version="1.0" encoding="utf-8"?>
+<p:sld xmlns:a="http://schemas.openxmlformats.org/drawingml/2006/main" xmlns:r="http://schemas.openxmlformats.org/officeDocument/2006/relationships" xmlns:p="http://schemas.openxmlformats.org/presentationml/2006/main">
+  <p:cSld>
+    <p:spTree>
+      <p:nvGrpSpPr>
+        <p:cNvPr id="1" name=""/>
+        <p:cNvGrpSpPr/>
+        <p:nvPr/>
+      </p:nvGrpSpPr>
+      <p:grpSpPr>
+        <a:xfrm>
+          <a:off x="0" y="0"/>
+          <a:ext cx="0" cy="0"/>
+          <a:chOff x="0" y="0"/>
+          <a:chExt cx="0" cy="0"/>
+        </a:xfrm>
+      </p:grpSpPr>
+      <p:sp>
+        <p:nvSpPr>
+          <p:cNvPr id="2" name="Текст 1">
+            <a:extLst>
+              <a:ext uri="{FF2B5EF4-FFF2-40B4-BE49-F238E27FC236}">
+                <a16:creationId xmlns:a16="http://schemas.microsoft.com/office/drawing/2014/main" id="{34CF7266-1A7A-9629-D9A6-5784F0346D64}"/>
+              </a:ext>
+            </a:extLst>
+          </p:cNvPr>
+          <p:cNvSpPr>
+            <a:spLocks noGrp="1"/>
+          </p:cNvSpPr>
+          <p:nvPr>
+            <p:ph type="body" sz="half" idx="11"/>
+          </p:nvPr>
+        </p:nvSpPr>
+        <p:spPr/>
+        <p:txBody>
+          <a:bodyPr/>
+          <a:lstStyle/>
+          <a:p>
+            <a:r>
+              <a:rPr lang="ru-RU" dirty="0"/>
+              <a:t>ССЫЛКИ</a:t>
+            </a:r>
+          </a:p>
+        </p:txBody>
+      </p:sp>
+      <p:sp>
+        <p:nvSpPr>
+          <p:cNvPr id="4" name="Текст 3">
+            <a:extLst>
+              <a:ext uri="{FF2B5EF4-FFF2-40B4-BE49-F238E27FC236}">
+                <a16:creationId xmlns:a16="http://schemas.microsoft.com/office/drawing/2014/main" id="{8A2D0C14-EAD0-9B0E-6354-FD1A4344047A}"/>
+              </a:ext>
+            </a:extLst>
+          </p:cNvPr>
+          <p:cNvSpPr>
+            <a:spLocks noGrp="1"/>
+          </p:cNvSpPr>
+          <p:nvPr>
+            <p:ph type="body" sz="half" idx="14"/>
+          </p:nvPr>
+        </p:nvSpPr>
+        <p:spPr/>
+        <p:txBody>
+          <a:bodyPr/>
+          <a:lstStyle/>
+          <a:p>
+            <a:r>
+              <a:rPr lang="ru-RU" dirty="0"/>
+              <a:t>Заключение</a:t>
+            </a:r>
+          </a:p>
+        </p:txBody>
+      </p:sp>
+      <p:sp>
+        <p:nvSpPr>
+          <p:cNvPr id="3" name="TextBox 2"/>
+          <p:cNvSpPr txBox="1"/>
+          <p:nvPr/>
+        </p:nvSpPr>
+        <p:spPr>
+          <a:xfrm>
+            <a:off x="5015880" y="2933945"/>
+            <a:ext cx="1170130" cy="369332"/>
+          </a:xfrm>
+          <a:prstGeom prst="rect">
+            <a:avLst/>
+          </a:prstGeom>
+          <a:noFill/>
+        </p:spPr>
+        <p:txBody>
+          <a:bodyPr wrap="square" rtlCol="0">
+            <a:spAutoFit/>
+          </a:bodyPr>
+          <a:lstStyle/>
+          <a:p>
+            <a:r>
+              <a:rPr lang="en-US" dirty="0" smtClean="0"/>
+              <a:t>QR here</a:t>
+            </a:r>
+            <a:endParaRPr lang="ru-RU" dirty="0"/>
+          </a:p>
+        </p:txBody>
+      </p:sp>
+    </p:spTree>
+    <p:extLst>
+      <p:ext uri="{BB962C8B-B14F-4D97-AF65-F5344CB8AC3E}">
+        <p14:creationId xmlns:p14="http://schemas.microsoft.com/office/powerpoint/2010/main" val="2906767701"/>
+      </p:ext>
+    </p:extLst>
+  </p:cSld>
+  <p:clrMapOvr>
+    <a:masterClrMapping/>
+  </p:clrMapOvr>
+  <p:timing>
+    <p:tnLst>
+      <p:par>
+        <p:cTn id="1" dur="indefinite" restart="never" nodeType="tmRoot"/>
+      </p:par>
+    </p:tnLst>
+  </p:timing>
+</p:sld>
+</file>
+
+<file path=ppt/slides/slide11.xml><?xml version="1.0" encoding="utf-8"?>
+<p:sld xmlns:a="http://schemas.openxmlformats.org/drawingml/2006/main" xmlns:r="http://schemas.openxmlformats.org/officeDocument/2006/relationships" xmlns:p="http://schemas.openxmlformats.org/presentationml/2006/main">
+  <p:cSld>
+    <p:spTree>
+      <p:nvGrpSpPr>
+        <p:cNvPr id="1" name=""/>
+        <p:cNvGrpSpPr/>
+        <p:nvPr/>
+      </p:nvGrpSpPr>
+      <p:grpSpPr>
+        <a:xfrm>
+          <a:off x="0" y="0"/>
+          <a:ext cx="0" cy="0"/>
+          <a:chOff x="0" y="0"/>
+          <a:chExt cx="0" cy="0"/>
+        </a:xfrm>
+      </p:grpSpPr>
+      <p:sp>
+        <p:nvSpPr>
+          <p:cNvPr id="2" name="Текст 1">
+            <a:extLst>
+              <a:ext uri="{FF2B5EF4-FFF2-40B4-BE49-F238E27FC236}">
+                <a16:creationId xmlns:a16="http://schemas.microsoft.com/office/drawing/2014/main" id="{34CF7266-1A7A-9629-D9A6-5784F0346D64}"/>
+              </a:ext>
+            </a:extLst>
+          </p:cNvPr>
+          <p:cNvSpPr>
+            <a:spLocks noGrp="1"/>
+          </p:cNvSpPr>
+          <p:nvPr>
+            <p:ph type="body" sz="half" idx="11"/>
+          </p:nvPr>
+        </p:nvSpPr>
+        <p:spPr/>
+        <p:txBody>
+          <a:bodyPr/>
+          <a:lstStyle/>
+          <a:p>
+            <a:r>
+              <a:rPr lang="ru-RU" dirty="0" smtClean="0"/>
+              <a:t>ЗАГОЛОВОК</a:t>
+            </a:r>
+            <a:endParaRPr lang="ru-RU" dirty="0"/>
+          </a:p>
+        </p:txBody>
+      </p:sp>
+      <p:sp>
+        <p:nvSpPr>
+          <p:cNvPr id="4" name="Текст 3">
+            <a:extLst>
+              <a:ext uri="{FF2B5EF4-FFF2-40B4-BE49-F238E27FC236}">
+                <a16:creationId xmlns:a16="http://schemas.microsoft.com/office/drawing/2014/main" id="{8A2D0C14-EAD0-9B0E-6354-FD1A4344047A}"/>
+              </a:ext>
+            </a:extLst>
+          </p:cNvPr>
+          <p:cNvSpPr>
+            <a:spLocks noGrp="1"/>
+          </p:cNvSpPr>
+          <p:nvPr>
+            <p:ph type="body" sz="half" idx="14"/>
+          </p:nvPr>
+        </p:nvSpPr>
+        <p:spPr/>
+        <p:txBody>
+          <a:bodyPr/>
+          <a:lstStyle/>
+          <a:p>
+            <a:r>
+              <a:rPr lang="ru-RU" dirty="0" smtClean="0"/>
+              <a:t>Раздел</a:t>
+            </a:r>
+            <a:endParaRPr lang="ru-RU" dirty="0"/>
+          </a:p>
+        </p:txBody>
+      </p:sp>
+    </p:spTree>
+    <p:extLst>
+      <p:ext uri="{BB962C8B-B14F-4D97-AF65-F5344CB8AC3E}">
+        <p14:creationId xmlns:p14="http://schemas.microsoft.com/office/powerpoint/2010/main" val="421904790"/>
+      </p:ext>
+    </p:extLst>
+  </p:cSld>
+  <p:clrMapOvr>
+    <a:masterClrMapping/>
+  </p:clrMapOvr>
+  <p:timing>
+    <p:tnLst>
+      <p:par>
+        <p:cTn id="1" dur="indefinite" restart="never" nodeType="tmRoot"/>
+      </p:par>
+    </p:tnLst>
+  </p:timing>
+</p:sld>
+</file>
+
+<file path=ppt/slides/slide12.xml><?xml version="1.0" encoding="utf-8"?>
+<p:sld xmlns:a="http://schemas.openxmlformats.org/drawingml/2006/main" xmlns:r="http://schemas.openxmlformats.org/officeDocument/2006/relationships" xmlns:p="http://schemas.openxmlformats.org/presentationml/2006/main">
+  <p:cSld>
+    <p:spTree>
+      <p:nvGrpSpPr>
+        <p:cNvPr id="1" name=""/>
+        <p:cNvGrpSpPr/>
+        <p:nvPr/>
+      </p:nvGrpSpPr>
+      <p:grpSpPr>
+        <a:xfrm>
+          <a:off x="0" y="0"/>
+          <a:ext cx="0" cy="0"/>
+          <a:chOff x="0" y="0"/>
+          <a:chExt cx="0" cy="0"/>
+        </a:xfrm>
+      </p:grpSpPr>
+      <p:sp>
+        <p:nvSpPr>
+          <p:cNvPr id="2" name="Текст 1">
+            <a:extLst>
+              <a:ext uri="{FF2B5EF4-FFF2-40B4-BE49-F238E27FC236}">
+                <a16:creationId xmlns:a16="http://schemas.microsoft.com/office/drawing/2014/main" id="{34CF7266-1A7A-9629-D9A6-5784F0346D64}"/>
+              </a:ext>
+            </a:extLst>
+          </p:cNvPr>
+          <p:cNvSpPr>
+            <a:spLocks noGrp="1"/>
+          </p:cNvSpPr>
+          <p:nvPr>
+            <p:ph type="body" sz="half" idx="11"/>
+          </p:nvPr>
+        </p:nvSpPr>
+        <p:spPr/>
+        <p:txBody>
+          <a:bodyPr/>
+          <a:lstStyle/>
+          <a:p>
+            <a:r>
+              <a:rPr lang="ru-RU" dirty="0"/>
+              <a:t>ССЫЛКИ</a:t>
+            </a:r>
+          </a:p>
+        </p:txBody>
+      </p:sp>
+      <p:sp>
+        <p:nvSpPr>
+          <p:cNvPr id="4" name="Текст 3">
+            <a:extLst>
+              <a:ext uri="{FF2B5EF4-FFF2-40B4-BE49-F238E27FC236}">
+                <a16:creationId xmlns:a16="http://schemas.microsoft.com/office/drawing/2014/main" id="{8A2D0C14-EAD0-9B0E-6354-FD1A4344047A}"/>
+              </a:ext>
+            </a:extLst>
+          </p:cNvPr>
+          <p:cNvSpPr>
+            <a:spLocks noGrp="1"/>
+          </p:cNvSpPr>
+          <p:nvPr>
+            <p:ph type="body" sz="half" idx="14"/>
+          </p:nvPr>
+        </p:nvSpPr>
+        <p:spPr/>
+        <p:txBody>
+          <a:bodyPr/>
+          <a:lstStyle/>
+          <a:p>
+            <a:r>
+              <a:rPr lang="ru-RU" dirty="0"/>
+              <a:t>Заключение</a:t>
+            </a:r>
+          </a:p>
+        </p:txBody>
+      </p:sp>
+      <p:sp>
+        <p:nvSpPr>
+          <p:cNvPr id="5" name="TextBox 4"/>
+          <p:cNvSpPr txBox="1"/>
+          <p:nvPr/>
+        </p:nvSpPr>
+        <p:spPr>
+          <a:xfrm>
+            <a:off x="605390" y="1538790"/>
+            <a:ext cx="11296255" cy="646331"/>
+          </a:xfrm>
+          <a:prstGeom prst="rect">
+            <a:avLst/>
+          </a:prstGeom>
+          <a:noFill/>
+        </p:spPr>
+        <p:txBody>
+          <a:bodyPr wrap="square" rtlCol="0">
+            <a:spAutoFit/>
+          </a:bodyPr>
+          <a:lstStyle/>
+          <a:p>
+            <a:pPr marL="342900" indent="-342900">
+              <a:buAutoNum type="arabicPeriod"/>
+            </a:pPr>
+            <a:r>
+              <a:rPr lang="en-US" dirty="0"/>
+              <a:t>h</a:t>
+            </a:r>
+            <a:r>
+              <a:rPr lang="en-US" dirty="0" smtClean="0"/>
+              <a:t>ttps</a:t>
+            </a:r>
+            <a:r>
+              <a:rPr lang="en-US" dirty="0"/>
+              <a:t>://</a:t>
+            </a:r>
+            <a:r>
+              <a:rPr lang="en-US" dirty="0" smtClean="0"/>
+              <a:t>ru.wikipedia.org/wiki/</a:t>
+            </a:r>
+            <a:r>
+              <a:rPr lang="ru-RU" dirty="0" err="1" smtClean="0"/>
+              <a:t>Фаззинг</a:t>
+            </a:r>
+            <a:endParaRPr lang="ru-RU" dirty="0" smtClean="0"/>
+          </a:p>
+          <a:p>
+            <a:pPr marL="342900" indent="-342900">
+              <a:buAutoNum type="arabicPeriod"/>
+            </a:pPr>
+            <a:endParaRPr lang="ru-RU" dirty="0"/>
+          </a:p>
+        </p:txBody>
+      </p:sp>
+    </p:spTree>
+    <p:extLst>
+      <p:ext uri="{BB962C8B-B14F-4D97-AF65-F5344CB8AC3E}">
+        <p14:creationId xmlns:p14="http://schemas.microsoft.com/office/powerpoint/2010/main" val="757873035"/>
+      </p:ext>
+    </p:extLst>
+  </p:cSld>
+  <p:clrMapOvr>
+    <a:masterClrMapping/>
+  </p:clrMapOvr>
+  <p:timing>
+    <p:tnLst>
+      <p:par>
+        <p:cTn id="1" dur="indefinite" restart="never" nodeType="tmRoot"/>
+      </p:par>
+    </p:tnLst>
+  </p:timing>
+</p:sld>
+</file>
+
+<file path=ppt/slides/slide13.xml><?xml version="1.0" encoding="utf-8"?>
+<p:sld xmlns:a="http://schemas.openxmlformats.org/drawingml/2006/main" xmlns:r="http://schemas.openxmlformats.org/officeDocument/2006/relationships" xmlns:p="http://schemas.openxmlformats.org/presentationml/2006/main">
+  <p:cSld>
+    <p:spTree>
+      <p:nvGrpSpPr>
+        <p:cNvPr id="1" name=""/>
+        <p:cNvGrpSpPr/>
+        <p:nvPr/>
+      </p:nvGrpSpPr>
+      <p:grpSpPr>
+        <a:xfrm>
+          <a:off x="0" y="0"/>
+          <a:ext cx="0" cy="0"/>
+          <a:chOff x="0" y="0"/>
+          <a:chExt cx="0" cy="0"/>
+        </a:xfrm>
+      </p:grpSpPr>
+      <p:sp>
+        <p:nvSpPr>
+          <p:cNvPr id="3" name="Текст 3">
+            <a:extLst>
+              <a:ext uri="{FF2B5EF4-FFF2-40B4-BE49-F238E27FC236}">
+                <a16:creationId xmlns:a16="http://schemas.microsoft.com/office/drawing/2014/main" id="{8A2D0C14-EAD0-9B0E-6354-FD1A4344047A}"/>
+              </a:ext>
+            </a:extLst>
+          </p:cNvPr>
+          <p:cNvSpPr txBox="1">
+            <a:spLocks/>
+          </p:cNvSpPr>
+          <p:nvPr/>
+        </p:nvSpPr>
+        <p:spPr>
+          <a:xfrm>
+            <a:off x="5780965" y="3519010"/>
+            <a:ext cx="4815535" cy="675075"/>
+          </a:xfrm>
+          <a:prstGeom prst="rect">
+            <a:avLst/>
+          </a:prstGeom>
+        </p:spPr>
+        <p:txBody>
+          <a:bodyPr/>
+          <a:lstStyle>
+            <a:lvl1pPr marL="228600" indent="-228600" algn="l" defTabSz="914400" rtl="0" eaLnBrk="1" latinLnBrk="0" hangingPunct="1">
+              <a:lnSpc>
+                <a:spcPct val="90000"/>
+              </a:lnSpc>
+              <a:spcBef>
+                <a:spcPts val="1000"/>
+              </a:spcBef>
+              <a:buFont typeface="Arial" panose="020B0604020202020204" pitchFamily="34" charset="0"/>
+              <a:buChar char="•"/>
+              <a:defRPr sz="2800" kern="1200">
+                <a:solidFill>
+                  <a:schemeClr val="tx1"/>
+                </a:solidFill>
+                <a:latin typeface="+mn-lt"/>
+                <a:ea typeface="+mn-ea"/>
+                <a:cs typeface="+mn-cs"/>
+              </a:defRPr>
+            </a:lvl1pPr>
+            <a:lvl2pPr marL="685800" indent="-228600" algn="l" defTabSz="914400" rtl="0" eaLnBrk="1" latinLnBrk="0" hangingPunct="1">
+              <a:lnSpc>
+                <a:spcPct val="90000"/>
+              </a:lnSpc>
+              <a:spcBef>
+                <a:spcPts val="500"/>
+              </a:spcBef>
+              <a:buFont typeface="Arial" panose="020B0604020202020204" pitchFamily="34" charset="0"/>
+              <a:buChar char="•"/>
+              <a:defRPr sz="2400" kern="1200">
+                <a:solidFill>
+                  <a:schemeClr val="tx1"/>
+                </a:solidFill>
+                <a:latin typeface="+mn-lt"/>
+                <a:ea typeface="+mn-ea"/>
+                <a:cs typeface="+mn-cs"/>
+              </a:defRPr>
+            </a:lvl2pPr>
+            <a:lvl3pPr marL="1143000" indent="-228600" algn="l" defTabSz="914400" rtl="0" eaLnBrk="1" latinLnBrk="0" hangingPunct="1">
+              <a:lnSpc>
+                <a:spcPct val="90000"/>
+              </a:lnSpc>
+              <a:spcBef>
+                <a:spcPts val="500"/>
+              </a:spcBef>
+              <a:buFont typeface="Arial" panose="020B0604020202020204" pitchFamily="34" charset="0"/>
+              <a:buChar char="•"/>
+              <a:defRPr sz="2000" kern="1200">
+                <a:solidFill>
+                  <a:schemeClr val="tx1"/>
+                </a:solidFill>
+                <a:latin typeface="+mn-lt"/>
+                <a:ea typeface="+mn-ea"/>
+                <a:cs typeface="+mn-cs"/>
+              </a:defRPr>
+            </a:lvl3pPr>
+            <a:lvl4pPr marL="1600200" indent="-228600" algn="l" defTabSz="914400" rtl="0" eaLnBrk="1" latinLnBrk="0" hangingPunct="1">
+              <a:lnSpc>
+                <a:spcPct val="90000"/>
+              </a:lnSpc>
+              <a:spcBef>
+                <a:spcPts val="500"/>
+              </a:spcBef>
+              <a:buFont typeface="Arial" panose="020B0604020202020204" pitchFamily="34" charset="0"/>
+              <a:buChar char="•"/>
+              <a:defRPr sz="1800" kern="1200">
+                <a:solidFill>
+                  <a:schemeClr val="tx1"/>
+                </a:solidFill>
+                <a:latin typeface="+mn-lt"/>
+                <a:ea typeface="+mn-ea"/>
+                <a:cs typeface="+mn-cs"/>
+              </a:defRPr>
+            </a:lvl4pPr>
+            <a:lvl5pPr marL="2057400" indent="-228600" algn="l" defTabSz="914400" rtl="0" eaLnBrk="1" latinLnBrk="0" hangingPunct="1">
+              <a:lnSpc>
+                <a:spcPct val="90000"/>
+              </a:lnSpc>
+              <a:spcBef>
+                <a:spcPts val="500"/>
+              </a:spcBef>
+              <a:buFont typeface="Arial" panose="020B0604020202020204" pitchFamily="34" charset="0"/>
+              <a:buChar char="•"/>
+              <a:defRPr sz="1800" kern="1200">
+                <a:solidFill>
+                  <a:schemeClr val="tx1"/>
+                </a:solidFill>
+                <a:latin typeface="+mn-lt"/>
+                <a:ea typeface="+mn-ea"/>
+                <a:cs typeface="+mn-cs"/>
+              </a:defRPr>
+            </a:lvl5pPr>
+            <a:lvl6pPr marL="2514600" indent="-228600" algn="l" defTabSz="914400" rtl="0" eaLnBrk="1" latinLnBrk="0" hangingPunct="1">
+              <a:lnSpc>
+                <a:spcPct val="90000"/>
+              </a:lnSpc>
+              <a:spcBef>
+                <a:spcPts val="500"/>
+              </a:spcBef>
+              <a:buFont typeface="Arial" panose="020B0604020202020204" pitchFamily="34" charset="0"/>
+              <a:buChar char="•"/>
+              <a:defRPr sz="1800" kern="1200">
+                <a:solidFill>
+                  <a:schemeClr val="tx1"/>
+                </a:solidFill>
+                <a:latin typeface="+mn-lt"/>
+                <a:ea typeface="+mn-ea"/>
+                <a:cs typeface="+mn-cs"/>
+              </a:defRPr>
+            </a:lvl6pPr>
+            <a:lvl7pPr marL="2971800" indent="-228600" algn="l" defTabSz="914400" rtl="0" eaLnBrk="1" latinLnBrk="0" hangingPunct="1">
+              <a:lnSpc>
+                <a:spcPct val="90000"/>
+              </a:lnSpc>
+              <a:spcBef>
+                <a:spcPts val="500"/>
+              </a:spcBef>
+              <a:buFont typeface="Arial" panose="020B0604020202020204" pitchFamily="34" charset="0"/>
+              <a:buChar char="•"/>
+              <a:defRPr sz="1800" kern="1200">
+                <a:solidFill>
+                  <a:schemeClr val="tx1"/>
+                </a:solidFill>
+                <a:latin typeface="+mn-lt"/>
+                <a:ea typeface="+mn-ea"/>
+                <a:cs typeface="+mn-cs"/>
+              </a:defRPr>
+            </a:lvl7pPr>
+            <a:lvl8pPr marL="3429000" indent="-228600" algn="l" defTabSz="914400" rtl="0" eaLnBrk="1" latinLnBrk="0" hangingPunct="1">
+              <a:lnSpc>
+                <a:spcPct val="90000"/>
+              </a:lnSpc>
+              <a:spcBef>
+                <a:spcPts val="500"/>
+              </a:spcBef>
+              <a:buFont typeface="Arial" panose="020B0604020202020204" pitchFamily="34" charset="0"/>
+              <a:buChar char="•"/>
+              <a:defRPr sz="1800" kern="1200">
+                <a:solidFill>
+                  <a:schemeClr val="tx1"/>
+                </a:solidFill>
+                <a:latin typeface="+mn-lt"/>
+                <a:ea typeface="+mn-ea"/>
+                <a:cs typeface="+mn-cs"/>
+              </a:defRPr>
+            </a:lvl8pPr>
+            <a:lvl9pPr marL="3886200" indent="-228600" algn="l" defTabSz="914400" rtl="0" eaLnBrk="1" latinLnBrk="0" hangingPunct="1">
+              <a:lnSpc>
+                <a:spcPct val="90000"/>
+              </a:lnSpc>
+              <a:spcBef>
+                <a:spcPts val="500"/>
+              </a:spcBef>
+              <a:buFont typeface="Arial" panose="020B0604020202020204" pitchFamily="34" charset="0"/>
+              <a:buChar char="•"/>
+              <a:defRPr sz="1800" kern="1200">
+                <a:solidFill>
+                  <a:schemeClr val="tx1"/>
+                </a:solidFill>
+                <a:latin typeface="+mn-lt"/>
+                <a:ea typeface="+mn-ea"/>
+                <a:cs typeface="+mn-cs"/>
+              </a:defRPr>
+            </a:lvl9pPr>
+          </a:lstStyle>
+          <a:p>
+            <a:pPr marL="0" indent="0">
+              <a:buNone/>
+            </a:pPr>
+            <a:r>
+              <a:rPr lang="ru-RU" sz="3200" b="1" dirty="0" smtClean="0">
+                <a:solidFill>
+                  <a:schemeClr val="bg1"/>
+                </a:solidFill>
+                <a:latin typeface="Segoe UI Semilight" panose="020B0402040204020203" pitchFamily="34" charset="0"/>
+                <a:cs typeface="Segoe UI Semilight" panose="020B0402040204020203" pitchFamily="34" charset="0"/>
+              </a:rPr>
+              <a:t>Спасибо за внимание!</a:t>
+            </a:r>
+            <a:endParaRPr lang="ru-RU" sz="3200" b="1" dirty="0">
+              <a:solidFill>
+                <a:schemeClr val="bg1"/>
+              </a:solidFill>
+              <a:latin typeface="Segoe UI Semilight" panose="020B0402040204020203" pitchFamily="34" charset="0"/>
+              <a:cs typeface="Segoe UI Semilight" panose="020B0402040204020203" pitchFamily="34" charset="0"/>
+            </a:endParaRPr>
+          </a:p>
+        </p:txBody>
+      </p:sp>
+    </p:spTree>
+    <p:extLst>
+      <p:ext uri="{BB962C8B-B14F-4D97-AF65-F5344CB8AC3E}">
+        <p14:creationId xmlns:p14="http://schemas.microsoft.com/office/powerpoint/2010/main" val="2203234034"/>
+      </p:ext>
+    </p:extLst>
+  </p:cSld>
+  <p:clrMapOvr>
+    <a:masterClrMapping/>
+  </p:clrMapOvr>
+  <p:timing>
+    <p:tnLst>
+      <p:par>
+        <p:cTn id="1" dur="indefinite" restart="never" nodeType="tmRoot"/>
+      </p:par>
+    </p:tnLst>
+  </p:timing>
+</p:sld>
+</file>
+
 <file path=ppt/slides/slide2.xml><?xml version="1.0" encoding="utf-8"?>
 <p:sld xmlns:a="http://schemas.openxmlformats.org/drawingml/2006/main" xmlns:r="http://schemas.openxmlformats.org/officeDocument/2006/relationships" xmlns:p="http://schemas.openxmlformats.org/presentationml/2006/main">
   <p:cSld>
@@ -16717,6 +17338,45 @@
           <a:chExt cx="0" cy="0"/>
         </a:xfrm>
       </p:grpSpPr>
+      <p:pic>
+        <p:nvPicPr>
+          <p:cNvPr id="2050" name="Picture 2" descr="https://prosoftsystems.ru/uploads/public/images/Catalog/DAES/11xx/ARIS-1105_left.jpg"/>
+          <p:cNvPicPr>
+            <a:picLocks noChangeAspect="1" noChangeArrowheads="1"/>
+          </p:cNvPicPr>
+          <p:nvPr/>
+        </p:nvPicPr>
+        <p:blipFill rotWithShape="1">
+          <a:blip r:embed="rId2">
+            <a:extLst>
+              <a:ext uri="{28A0092B-C50C-407E-A947-70E740481C1C}">
+                <a14:useLocalDpi xmlns:a14="http://schemas.microsoft.com/office/drawing/2010/main" val="0"/>
+              </a:ext>
+            </a:extLst>
+          </a:blip>
+          <a:srcRect l="18454" t="29894" r="18793" b="29340"/>
+          <a:stretch/>
+        </p:blipFill>
+        <p:spPr bwMode="auto">
+          <a:xfrm flipH="1">
+            <a:off x="7446150" y="2888940"/>
+            <a:ext cx="4590511" cy="3735415"/>
+          </a:xfrm>
+          <a:prstGeom prst="rect">
+            <a:avLst/>
+          </a:prstGeom>
+          <a:noFill/>
+          <a:extLst>
+            <a:ext uri="{909E8E84-426E-40DD-AFC4-6F175D3DCCD1}">
+              <a14:hiddenFill xmlns:a14="http://schemas.microsoft.com/office/drawing/2010/main">
+                <a:solidFill>
+                  <a:srgbClr val="FFFFFF"/>
+                </a:solidFill>
+              </a14:hiddenFill>
+            </a:ext>
+          </a:extLst>
+        </p:spPr>
+      </p:pic>
       <p:sp>
         <p:nvSpPr>
           <p:cNvPr id="2" name="Текст 1">
@@ -16739,9 +17399,10 @@
           <a:lstStyle/>
           <a:p>
             <a:r>
-              <a:rPr lang="ru-RU" dirty="0"/>
-              <a:t>ССЫЛКИ</a:t>
-            </a:r>
+              <a:rPr lang="ru-RU" dirty="0" smtClean="0"/>
+              <a:t>ЗАДАЧА</a:t>
+            </a:r>
+            <a:endParaRPr lang="ru-RU" dirty="0"/>
           </a:p>
         </p:txBody>
       </p:sp>
@@ -16767,22 +17428,23 @@
           <a:lstStyle/>
           <a:p>
             <a:r>
-              <a:rPr lang="ru-RU" dirty="0"/>
-              <a:t>Заключение</a:t>
-            </a:r>
-          </a:p>
-        </p:txBody>
-      </p:sp>
-      <p:sp>
-        <p:nvSpPr>
-          <p:cNvPr id="3" name="TextBox 2"/>
+              <a:rPr lang="ru-RU" dirty="0" smtClean="0"/>
+              <a:t>Введение</a:t>
+            </a:r>
+            <a:endParaRPr lang="ru-RU" dirty="0"/>
+          </a:p>
+        </p:txBody>
+      </p:sp>
+      <p:sp>
+        <p:nvSpPr>
+          <p:cNvPr id="5" name="TextBox 4"/>
           <p:cNvSpPr txBox="1"/>
           <p:nvPr/>
         </p:nvSpPr>
         <p:spPr>
           <a:xfrm>
-            <a:off x="5015880" y="2933945"/>
-            <a:ext cx="1170130" cy="369332"/>
+            <a:off x="442912" y="1752341"/>
+            <a:ext cx="7318273" cy="3416320"/>
           </a:xfrm>
           <a:prstGeom prst="rect">
             <a:avLst/>
@@ -16796,17 +17458,291 @@
           <a:lstStyle/>
           <a:p>
             <a:r>
-              <a:rPr lang="en-US" dirty="0" smtClean="0"/>
-              <a:t>QR here</a:t>
-            </a:r>
-            <a:endParaRPr lang="ru-RU" dirty="0"/>
+              <a:rPr lang="ru-RU" dirty="0" err="1" smtClean="0">
+                <a:solidFill>
+                  <a:sysClr val="windowText" lastClr="000000"/>
+                </a:solidFill>
+              </a:rPr>
+              <a:t>Фаззинг</a:t>
+            </a:r>
+            <a:r>
+              <a:rPr lang="ru-RU" dirty="0" smtClean="0">
+                <a:solidFill>
+                  <a:sysClr val="windowText" lastClr="000000"/>
+                </a:solidFill>
+              </a:rPr>
+              <a:t> многофункционального контроллера автоматизации электрических сетей «</a:t>
+            </a:r>
+            <a:r>
+              <a:rPr lang="en-US" dirty="0" smtClean="0">
+                <a:solidFill>
+                  <a:sysClr val="windowText" lastClr="000000"/>
+                </a:solidFill>
+              </a:rPr>
+              <a:t>ARIS</a:t>
+            </a:r>
+            <a:r>
+              <a:rPr lang="ru-RU" dirty="0" smtClean="0">
+                <a:solidFill>
+                  <a:sysClr val="windowText" lastClr="000000"/>
+                </a:solidFill>
+              </a:rPr>
+              <a:t>»</a:t>
+            </a:r>
+          </a:p>
+          <a:p>
+            <a:endParaRPr lang="ru-RU" dirty="0">
+              <a:solidFill>
+                <a:sysClr val="windowText" lastClr="000000"/>
+              </a:solidFill>
+            </a:endParaRPr>
+          </a:p>
+          <a:p>
+            <a:r>
+              <a:rPr lang="ru-RU" b="1" dirty="0" smtClean="0">
+                <a:solidFill>
+                  <a:sysClr val="windowText" lastClr="000000"/>
+                </a:solidFill>
+              </a:rPr>
+              <a:t>Сложности:</a:t>
+            </a:r>
+          </a:p>
+          <a:p>
+            <a:pPr marL="285750" indent="-285750">
+              <a:buFont typeface="Arial" panose="020B0604020202020204" pitchFamily="34" charset="0"/>
+              <a:buChar char="•"/>
+            </a:pPr>
+            <a:r>
+              <a:rPr lang="ru-RU" dirty="0" smtClean="0">
+                <a:solidFill>
+                  <a:sysClr val="windowText" lastClr="000000"/>
+                </a:solidFill>
+              </a:rPr>
+              <a:t>Ограниченные ресурсы платформы –</a:t>
+            </a:r>
+            <a:r>
+              <a:rPr lang="en-US" dirty="0" smtClean="0">
+                <a:solidFill>
+                  <a:sysClr val="windowText" lastClr="000000"/>
+                </a:solidFill>
+              </a:rPr>
+              <a:t>&gt;</a:t>
+            </a:r>
+            <a:r>
+              <a:rPr lang="ru-RU" dirty="0" smtClean="0">
+                <a:solidFill>
+                  <a:sysClr val="windowText" lastClr="000000"/>
+                </a:solidFill>
+              </a:rPr>
+              <a:t> медленное тестирование</a:t>
+            </a:r>
+            <a:endParaRPr lang="en-US" dirty="0" smtClean="0">
+              <a:solidFill>
+                <a:sysClr val="windowText" lastClr="000000"/>
+              </a:solidFill>
+            </a:endParaRPr>
+          </a:p>
+          <a:p>
+            <a:pPr marL="285750" indent="-285750">
+              <a:buFont typeface="Arial" panose="020B0604020202020204" pitchFamily="34" charset="0"/>
+              <a:buChar char="•"/>
+            </a:pPr>
+            <a:r>
+              <a:rPr lang="kk-KZ" dirty="0" smtClean="0">
+                <a:solidFill>
+                  <a:sysClr val="windowText" lastClr="000000"/>
+                </a:solidFill>
+              </a:rPr>
+              <a:t>Ограниченная обратная связь </a:t>
+            </a:r>
+            <a:r>
+              <a:rPr lang="ru-RU" dirty="0" smtClean="0">
+                <a:solidFill>
+                  <a:sysClr val="windowText" lastClr="000000"/>
+                </a:solidFill>
+              </a:rPr>
+              <a:t>–</a:t>
+            </a:r>
+            <a:r>
+              <a:rPr lang="en-US" dirty="0" smtClean="0">
+                <a:solidFill>
+                  <a:sysClr val="windowText" lastClr="000000"/>
+                </a:solidFill>
+              </a:rPr>
+              <a:t>&gt; </a:t>
+            </a:r>
+            <a:r>
+              <a:rPr lang="kk-KZ" dirty="0" smtClean="0">
+                <a:solidFill>
+                  <a:sysClr val="windowText" lastClr="000000"/>
+                </a:solidFill>
+              </a:rPr>
+              <a:t>только </a:t>
+            </a:r>
+            <a:r>
+              <a:rPr lang="en-US" dirty="0" err="1" smtClean="0">
+                <a:solidFill>
+                  <a:sysClr val="windowText" lastClr="000000"/>
+                </a:solidFill>
+              </a:rPr>
+              <a:t>blackbox</a:t>
+            </a:r>
+            <a:r>
+              <a:rPr lang="en-US" dirty="0" smtClean="0">
+                <a:solidFill>
+                  <a:sysClr val="windowText" lastClr="000000"/>
+                </a:solidFill>
+              </a:rPr>
+              <a:t> fuzzing</a:t>
+            </a:r>
+            <a:endParaRPr lang="ru-RU" dirty="0" smtClean="0">
+              <a:solidFill>
+                <a:sysClr val="windowText" lastClr="000000"/>
+              </a:solidFill>
+            </a:endParaRPr>
+          </a:p>
+          <a:p>
+            <a:pPr marL="285750" indent="-285750">
+              <a:buFont typeface="Arial" panose="020B0604020202020204" pitchFamily="34" charset="0"/>
+              <a:buChar char="•"/>
+            </a:pPr>
+            <a:r>
+              <a:rPr lang="ru-RU" dirty="0" smtClean="0">
+                <a:solidFill>
+                  <a:sysClr val="windowText" lastClr="000000"/>
+                </a:solidFill>
+              </a:rPr>
+              <a:t>Тесная интеграция </a:t>
+            </a:r>
+            <a:r>
+              <a:rPr lang="en-US" dirty="0" smtClean="0">
+                <a:solidFill>
+                  <a:sysClr val="windowText" lastClr="000000"/>
+                </a:solidFill>
+              </a:rPr>
+              <a:t>software &amp; hardware</a:t>
+            </a:r>
+            <a:r>
+              <a:rPr lang="ru-RU" dirty="0" smtClean="0">
+                <a:solidFill>
+                  <a:sysClr val="windowText" lastClr="000000"/>
+                </a:solidFill>
+              </a:rPr>
+              <a:t> компонентов системы</a:t>
+            </a:r>
+            <a:endParaRPr lang="kk-KZ" dirty="0" smtClean="0">
+              <a:solidFill>
+                <a:sysClr val="windowText" lastClr="000000"/>
+              </a:solidFill>
+            </a:endParaRPr>
+          </a:p>
+          <a:p>
+            <a:pPr marL="285750" indent="-285750">
+              <a:buFont typeface="Arial" panose="020B0604020202020204" pitchFamily="34" charset="0"/>
+              <a:buChar char="•"/>
+            </a:pPr>
+            <a:r>
+              <a:rPr lang="ru-RU" dirty="0" smtClean="0">
+                <a:solidFill>
+                  <a:sysClr val="windowText" lastClr="000000"/>
+                </a:solidFill>
+              </a:rPr>
+              <a:t>Трудности с</a:t>
+            </a:r>
+            <a:r>
+              <a:rPr lang="en-US" dirty="0" smtClean="0">
+                <a:solidFill>
+                  <a:sysClr val="windowText" lastClr="000000"/>
+                </a:solidFill>
+              </a:rPr>
+              <a:t> </a:t>
+            </a:r>
+            <a:r>
+              <a:rPr lang="ru-RU" dirty="0" smtClean="0">
+                <a:solidFill>
+                  <a:sysClr val="windowText" lastClr="000000"/>
+                </a:solidFill>
+              </a:rPr>
+              <a:t>коммуникацией, </a:t>
+            </a:r>
+            <a:r>
+              <a:rPr lang="ru-RU" dirty="0" err="1" smtClean="0">
+                <a:solidFill>
+                  <a:sysClr val="windowText" lastClr="000000"/>
+                </a:solidFill>
+              </a:rPr>
+              <a:t>воспроизводимостью</a:t>
+            </a:r>
+            <a:r>
+              <a:rPr lang="ru-RU" dirty="0" smtClean="0">
+                <a:solidFill>
+                  <a:sysClr val="windowText" lastClr="000000"/>
+                </a:solidFill>
+              </a:rPr>
+              <a:t> и отладкой</a:t>
+            </a:r>
+            <a:endParaRPr lang="en-US" dirty="0" smtClean="0">
+              <a:solidFill>
+                <a:sysClr val="windowText" lastClr="000000"/>
+              </a:solidFill>
+            </a:endParaRPr>
+          </a:p>
+          <a:p>
+            <a:pPr marL="285750" indent="-285750">
+              <a:buFont typeface="Arial" panose="020B0604020202020204" pitchFamily="34" charset="0"/>
+              <a:buChar char="•"/>
+            </a:pPr>
+            <a:r>
+              <a:rPr lang="kk-KZ" dirty="0" smtClean="0">
+                <a:solidFill>
+                  <a:sysClr val="windowText" lastClr="000000"/>
+                </a:solidFill>
+              </a:rPr>
+              <a:t>Плохая масштабируемость</a:t>
+            </a:r>
+          </a:p>
+          <a:p>
+            <a:pPr marL="285750" indent="-285750">
+              <a:buFont typeface="Arial" panose="020B0604020202020204" pitchFamily="34" charset="0"/>
+              <a:buChar char="•"/>
+            </a:pPr>
+            <a:endParaRPr lang="kk-KZ" dirty="0">
+              <a:solidFill>
+                <a:sysClr val="windowText" lastClr="000000"/>
+              </a:solidFill>
+            </a:endParaRPr>
+          </a:p>
+          <a:p>
+            <a:r>
+              <a:rPr lang="kk-KZ" b="1" dirty="0" smtClean="0">
+                <a:solidFill>
+                  <a:sysClr val="windowText" lastClr="000000"/>
+                </a:solidFill>
+              </a:rPr>
+              <a:t>Решение:</a:t>
+            </a:r>
+          </a:p>
+          <a:p>
+            <a:r>
+              <a:rPr lang="kk-KZ" dirty="0" smtClean="0">
+                <a:solidFill>
+                  <a:sysClr val="windowText" lastClr="000000"/>
+                </a:solidFill>
+              </a:rPr>
+              <a:t>Фаззинг виртуальной машины</a:t>
+            </a:r>
+            <a:endParaRPr lang="ru-RU" dirty="0">
+              <a:solidFill>
+                <a:sysClr val="windowText" lastClr="000000"/>
+              </a:solidFill>
+            </a:endParaRPr>
           </a:p>
         </p:txBody>
       </p:sp>
     </p:spTree>
     <p:extLst>
       <p:ext uri="{BB962C8B-B14F-4D97-AF65-F5344CB8AC3E}">
-        <p14:creationId xmlns:p14="http://schemas.microsoft.com/office/powerpoint/2010/main" val="2906767701"/>
+        <p14:creationId xmlns:p14="http://schemas.microsoft.com/office/powerpoint/2010/main" val="2320379428"/>
       </p:ext>
     </p:extLst>
   </p:cSld>
@@ -16856,14 +17792,19 @@
             <p:ph type="body" sz="half" idx="11"/>
           </p:nvPr>
         </p:nvSpPr>
-        <p:spPr/>
+        <p:spPr>
+          <a:xfrm>
+            <a:off x="442912" y="818710"/>
+            <a:ext cx="9974262" cy="381000"/>
+          </a:xfrm>
+        </p:spPr>
         <p:txBody>
           <a:bodyPr/>
           <a:lstStyle/>
           <a:p>
             <a:r>
-              <a:rPr lang="ru-RU" dirty="0" smtClean="0"/>
-              <a:t>ЗАГОЛОВОК</a:t>
+              <a:rPr lang="en-US" dirty="0" err="1" smtClean="0"/>
+              <a:t>TriforceAFL</a:t>
             </a:r>
             <a:endParaRPr lang="ru-RU" dirty="0"/>
           </a:p>
@@ -16891,17 +17832,198 @@
           <a:lstStyle/>
           <a:p>
             <a:r>
+              <a:rPr lang="kk-KZ" dirty="0" smtClean="0">
+                <a:solidFill>
+                  <a:sysClr val="windowText" lastClr="000000"/>
+                </a:solidFill>
+              </a:rPr>
+              <a:t>Фаззинг виртуальной машины</a:t>
+            </a:r>
+            <a:r>
+              <a:rPr lang="ru-RU" dirty="0" smtClean="0">
+                <a:solidFill>
+                  <a:sysClr val="windowText" lastClr="000000"/>
+                </a:solidFill>
+              </a:rPr>
+              <a:t>. Типы</a:t>
+            </a:r>
+            <a:endParaRPr lang="ru-RU" dirty="0">
+              <a:solidFill>
+                <a:sysClr val="windowText" lastClr="000000"/>
+              </a:solidFill>
+            </a:endParaRPr>
+          </a:p>
+        </p:txBody>
+      </p:sp>
+      <p:sp>
+        <p:nvSpPr>
+          <p:cNvPr id="5" name="TextBox 4"/>
+          <p:cNvSpPr txBox="1"/>
+          <p:nvPr/>
+        </p:nvSpPr>
+        <p:spPr>
+          <a:xfrm>
+            <a:off x="442912" y="1382939"/>
+            <a:ext cx="8578413" cy="2616101"/>
+          </a:xfrm>
+          <a:prstGeom prst="rect">
+            <a:avLst/>
+          </a:prstGeom>
+          <a:noFill/>
+        </p:spPr>
+        <p:txBody>
+          <a:bodyPr wrap="square" rtlCol="0">
+            <a:spAutoFit/>
+          </a:bodyPr>
+          <a:lstStyle/>
+          <a:p>
+            <a:r>
+              <a:rPr lang="ru-RU" dirty="0"/>
+              <a:t>Также, например, если файл собран </a:t>
+            </a:r>
+            <a:r>
+              <a:rPr lang="ru-RU" dirty="0" err="1"/>
+              <a:t>toolchain</a:t>
+            </a:r>
+            <a:r>
+              <a:rPr lang="ru-RU" dirty="0"/>
+              <a:t>, использующим аппаратные </a:t>
+            </a:r>
+            <a:r>
+              <a:rPr lang="ru-RU" dirty="0" err="1"/>
+              <a:t>фичи</a:t>
+            </a:r>
+            <a:r>
+              <a:rPr lang="ru-RU" dirty="0"/>
+              <a:t> </a:t>
+            </a:r>
+            <a:r>
+              <a:rPr lang="ru-RU" dirty="0" err="1"/>
+              <a:t>SoC</a:t>
+            </a:r>
+            <a:r>
+              <a:rPr lang="ru-RU" dirty="0"/>
+              <a:t>, на котором запускается </a:t>
+            </a:r>
+            <a:r>
+              <a:rPr lang="ru-RU" dirty="0" err="1"/>
+              <a:t>бинарь</a:t>
+            </a:r>
+            <a:r>
+              <a:rPr lang="ru-RU" dirty="0"/>
+              <a:t> и который не поддерживается </a:t>
+            </a:r>
+            <a:r>
+              <a:rPr lang="ru-RU" dirty="0" err="1"/>
+              <a:t>qemu</a:t>
+            </a:r>
+            <a:r>
+              <a:rPr lang="ru-RU" dirty="0"/>
+              <a:t>, </a:t>
+            </a:r>
+            <a:r>
+              <a:rPr lang="ru-RU" dirty="0" err="1"/>
+              <a:t>фаззинг</a:t>
+            </a:r>
+            <a:r>
+              <a:rPr lang="ru-RU" dirty="0"/>
+              <a:t> оборвется, как только встретится специфическая инструкция, или, например, будет использован специфический </a:t>
+            </a:r>
+            <a:r>
               <a:rPr lang="ru-RU" dirty="0" smtClean="0"/>
-              <a:t>Раздел</a:t>
-            </a:r>
-            <a:endParaRPr lang="ru-RU" dirty="0"/>
+              <a:t>MMIO</a:t>
+            </a:r>
+          </a:p>
+          <a:p>
+            <a:endParaRPr lang="ru-RU" sz="2000" dirty="0">
+              <a:solidFill>
+                <a:sysClr val="windowText" lastClr="000000"/>
+              </a:solidFill>
+            </a:endParaRPr>
+          </a:p>
+          <a:p>
+            <a:r>
+              <a:rPr lang="ru-RU" dirty="0"/>
+              <a:t>AFL/QEMU </a:t>
+            </a:r>
+            <a:r>
+              <a:rPr lang="ru-RU" dirty="0" err="1"/>
+              <a:t>фаззинг</a:t>
+            </a:r>
+            <a:r>
+              <a:rPr lang="ru-RU" dirty="0"/>
+              <a:t> с полной эмуляцией </a:t>
+            </a:r>
+            <a:r>
+              <a:rPr lang="ru-RU" dirty="0">
+                <a:hlinkClick r:id="rId2"/>
+              </a:rPr>
+              <a:t>системы</a:t>
+            </a:r>
+            <a:r>
+              <a:rPr lang="ru-RU" dirty="0"/>
+              <a:t>. </a:t>
+            </a:r>
+            <a:r>
+              <a:rPr lang="ru-RU" dirty="0" err="1"/>
+              <a:t>Форк</a:t>
+            </a:r>
+            <a:r>
+              <a:rPr lang="ru-RU" dirty="0"/>
+              <a:t> от </a:t>
+            </a:r>
+            <a:r>
+              <a:rPr lang="ru-RU" dirty="0" err="1"/>
+              <a:t>nccgroup</a:t>
+            </a:r>
+            <a:r>
+              <a:rPr lang="ru-RU" dirty="0"/>
+              <a:t>. Позволяет в </a:t>
+            </a:r>
+            <a:r>
+              <a:rPr lang="ru-RU" dirty="0" err="1"/>
+              <a:t>qemu</a:t>
+            </a:r>
+            <a:r>
+              <a:rPr lang="ru-RU" dirty="0"/>
+              <a:t> режиме </a:t>
+            </a:r>
+            <a:r>
+              <a:rPr lang="ru-RU" dirty="0" err="1"/>
+              <a:t>фаззить</a:t>
+            </a:r>
+            <a:r>
+              <a:rPr lang="ru-RU" dirty="0"/>
+              <a:t> операционную систему целиком. Реализован через специальную инструкцию (</a:t>
+            </a:r>
+            <a:r>
+              <a:rPr lang="ru-RU" dirty="0" err="1"/>
+              <a:t>aflCall</a:t>
+            </a:r>
+            <a:r>
+              <a:rPr lang="ru-RU" dirty="0"/>
+              <a:t> (0f 24)), которая была добавлена в QEMU x64 CPU. К сожалению, уже не поддерживается, последняя версия </a:t>
+            </a:r>
+            <a:r>
+              <a:rPr lang="ru-RU" dirty="0" err="1"/>
+              <a:t>afl</a:t>
+            </a:r>
+            <a:r>
+              <a:rPr lang="ru-RU" dirty="0"/>
+              <a:t> в нем 2.06b.</a:t>
+            </a:r>
+            <a:endParaRPr lang="ru-RU" sz="2000" dirty="0">
+              <a:solidFill>
+                <a:sysClr val="windowText" lastClr="000000"/>
+              </a:solidFill>
+            </a:endParaRPr>
           </a:p>
         </p:txBody>
       </p:sp>
     </p:spTree>
     <p:extLst>
       <p:ext uri="{BB962C8B-B14F-4D97-AF65-F5344CB8AC3E}">
-        <p14:creationId xmlns:p14="http://schemas.microsoft.com/office/powerpoint/2010/main" val="421904790"/>
+        <p14:creationId xmlns:p14="http://schemas.microsoft.com/office/powerpoint/2010/main" val="352092235"/>
       </p:ext>
     </p:extLst>
   </p:cSld>
@@ -16951,15 +18073,21 @@
             <p:ph type="body" sz="half" idx="11"/>
           </p:nvPr>
         </p:nvSpPr>
-        <p:spPr/>
+        <p:spPr>
+          <a:xfrm>
+            <a:off x="442912" y="818710"/>
+            <a:ext cx="9974262" cy="381000"/>
+          </a:xfrm>
+        </p:spPr>
         <p:txBody>
           <a:bodyPr/>
           <a:lstStyle/>
           <a:p>
             <a:r>
-              <a:rPr lang="ru-RU" dirty="0"/>
-              <a:t>ССЫЛКИ</a:t>
-            </a:r>
+              <a:rPr lang="ru-RU" dirty="0" smtClean="0"/>
+              <a:t>НЕДОСТАТКИ</a:t>
+            </a:r>
+            <a:endParaRPr lang="ru-RU" dirty="0"/>
           </a:p>
         </p:txBody>
       </p:sp>
@@ -16985,9 +18113,26 @@
           <a:lstStyle/>
           <a:p>
             <a:r>
-              <a:rPr lang="ru-RU" dirty="0"/>
-              <a:t>Заключение</a:t>
-            </a:r>
+              <a:rPr lang="kk-KZ" dirty="0">
+                <a:solidFill>
+                  <a:sysClr val="windowText" lastClr="000000"/>
+                </a:solidFill>
+              </a:rPr>
+              <a:t>Фаззинг виртуальной </a:t>
+            </a:r>
+            <a:r>
+              <a:rPr lang="kk-KZ" dirty="0" smtClean="0">
+                <a:solidFill>
+                  <a:sysClr val="windowText" lastClr="000000"/>
+                </a:solidFill>
+              </a:rPr>
+              <a:t>машины</a:t>
+            </a:r>
+            <a:endParaRPr lang="ru-RU" dirty="0">
+              <a:solidFill>
+                <a:sysClr val="windowText" lastClr="000000"/>
+              </a:solidFill>
+            </a:endParaRPr>
           </a:p>
         </p:txBody>
       </p:sp>
@@ -16999,8 +18144,8 @@
         </p:nvSpPr>
         <p:spPr>
           <a:xfrm>
-            <a:off x="605390" y="1538790"/>
-            <a:ext cx="11296255" cy="646331"/>
+            <a:off x="442912" y="1382939"/>
+            <a:ext cx="8578413" cy="4401205"/>
           </a:xfrm>
           <a:prstGeom prst="rect">
             <a:avLst/>
@@ -17013,43 +18158,191 @@
           </a:bodyPr>
           <a:lstStyle/>
           <a:p>
-            <a:pPr marL="342900" indent="-342900">
-              <a:buAutoNum type="arabicPeriod"/>
+            <a:pPr marL="285750" indent="-285750">
+              <a:buFont typeface="Arial" panose="020B0604020202020204" pitchFamily="34" charset="0"/>
+              <a:buChar char="•"/>
             </a:pPr>
             <a:r>
-              <a:rPr lang="en-US" dirty="0"/>
-              <a:t>h</a:t>
-            </a:r>
-            <a:r>
-              <a:rPr lang="en-US" dirty="0" smtClean="0"/>
-              <a:t>ttps</a:t>
-            </a:r>
-            <a:r>
-              <a:rPr lang="en-US" dirty="0"/>
-              <a:t>://</a:t>
-            </a:r>
-            <a:r>
-              <a:rPr lang="en-US" dirty="0" smtClean="0"/>
-              <a:t>ru.wikipedia.org/wiki/</a:t>
-            </a:r>
-            <a:r>
-              <a:rPr lang="ru-RU" dirty="0" err="1" smtClean="0"/>
-              <a:t>Фаззинг</a:t>
-            </a:r>
-            <a:endParaRPr lang="ru-RU" dirty="0" smtClean="0"/>
-          </a:p>
-          <a:p>
-            <a:pPr marL="342900" indent="-342900">
-              <a:buAutoNum type="arabicPeriod"/>
+              <a:rPr lang="ru-RU" sz="2000" dirty="0" smtClean="0">
+                <a:solidFill>
+                  <a:sysClr val="windowText" lastClr="000000"/>
+                </a:solidFill>
+              </a:rPr>
+              <a:t>Отсутствие </a:t>
+            </a:r>
+            <a:r>
+              <a:rPr lang="ru-RU" sz="2000" dirty="0" err="1" smtClean="0">
+                <a:solidFill>
+                  <a:sysClr val="windowText" lastClr="000000"/>
+                </a:solidFill>
+              </a:rPr>
+              <a:t>инструментации</a:t>
+            </a:r>
+            <a:r>
+              <a:rPr lang="ru-RU" sz="2000" dirty="0" smtClean="0">
+                <a:solidFill>
+                  <a:sysClr val="windowText" lastClr="000000"/>
+                </a:solidFill>
+              </a:rPr>
+              <a:t> не позволяет отследить ошибочные обращения к памяти</a:t>
+            </a:r>
+          </a:p>
+          <a:p>
+            <a:pPr marL="285750" indent="-285750">
+              <a:buFont typeface="Arial" panose="020B0604020202020204" pitchFamily="34" charset="0"/>
+              <a:buChar char="•"/>
             </a:pPr>
-            <a:endParaRPr lang="ru-RU" dirty="0"/>
+            <a:endParaRPr lang="ru-RU" sz="2000" dirty="0" smtClean="0">
+              <a:solidFill>
+                <a:sysClr val="windowText" lastClr="000000"/>
+              </a:solidFill>
+            </a:endParaRPr>
+          </a:p>
+          <a:p>
+            <a:pPr marL="285750" indent="-285750">
+              <a:buFont typeface="Arial" panose="020B0604020202020204" pitchFamily="34" charset="0"/>
+              <a:buChar char="•"/>
+            </a:pPr>
+            <a:r>
+              <a:rPr lang="ru-RU" sz="2000" dirty="0" smtClean="0">
+                <a:solidFill>
+                  <a:sysClr val="windowText" lastClr="000000"/>
+                </a:solidFill>
+              </a:rPr>
+              <a:t>Для воспроизведения ошибки может потребоваться повторить в точности всю историю </a:t>
+            </a:r>
+            <a:r>
+              <a:rPr lang="ru-RU" sz="2000" dirty="0" err="1" smtClean="0">
+                <a:solidFill>
+                  <a:sysClr val="windowText" lastClr="000000"/>
+                </a:solidFill>
+              </a:rPr>
+              <a:t>фаззинга</a:t>
+            </a:r>
+            <a:endParaRPr lang="ru-RU" sz="2000" dirty="0" smtClean="0">
+              <a:solidFill>
+                <a:sysClr val="windowText" lastClr="000000"/>
+              </a:solidFill>
+            </a:endParaRPr>
+          </a:p>
+          <a:p>
+            <a:pPr marL="285750" indent="-285750">
+              <a:buFont typeface="Arial" panose="020B0604020202020204" pitchFamily="34" charset="0"/>
+              <a:buChar char="•"/>
+            </a:pPr>
+            <a:endParaRPr lang="ru-RU" sz="2000" dirty="0" smtClean="0">
+              <a:solidFill>
+                <a:sysClr val="windowText" lastClr="000000"/>
+              </a:solidFill>
+            </a:endParaRPr>
+          </a:p>
+          <a:p>
+            <a:pPr marL="285750" indent="-285750">
+              <a:buFont typeface="Arial" panose="020B0604020202020204" pitchFamily="34" charset="0"/>
+              <a:buChar char="•"/>
+            </a:pPr>
+            <a:r>
+              <a:rPr lang="ru-RU" sz="2000" dirty="0" smtClean="0">
+                <a:solidFill>
+                  <a:sysClr val="windowText" lastClr="000000"/>
+                </a:solidFill>
+              </a:rPr>
+              <a:t>Нивелирует этот недостаток </a:t>
+            </a:r>
+            <a:r>
+              <a:rPr lang="en-US" sz="2000" dirty="0" smtClean="0">
+                <a:solidFill>
+                  <a:sysClr val="windowText" lastClr="000000"/>
+                </a:solidFill>
+              </a:rPr>
+              <a:t>snapshot-based </a:t>
+            </a:r>
+            <a:r>
+              <a:rPr lang="kk-KZ" sz="2000" dirty="0" smtClean="0">
+                <a:solidFill>
+                  <a:sysClr val="windowText" lastClr="000000"/>
+                </a:solidFill>
+              </a:rPr>
+              <a:t>подход</a:t>
+            </a:r>
+            <a:r>
+              <a:rPr lang="ru-RU" sz="2000" dirty="0" smtClean="0">
+                <a:solidFill>
+                  <a:sysClr val="windowText" lastClr="000000"/>
+                </a:solidFill>
+              </a:rPr>
+              <a:t>, который позволяет каждый прогон запускать на дампе виртуальной машины</a:t>
+            </a:r>
+          </a:p>
+          <a:p>
+            <a:pPr marL="285750" indent="-285750">
+              <a:buFont typeface="Arial" panose="020B0604020202020204" pitchFamily="34" charset="0"/>
+              <a:buChar char="•"/>
+            </a:pPr>
+            <a:endParaRPr lang="ru-RU" sz="2000" dirty="0" smtClean="0">
+              <a:solidFill>
+                <a:sysClr val="windowText" lastClr="000000"/>
+              </a:solidFill>
+            </a:endParaRPr>
+          </a:p>
+          <a:p>
+            <a:pPr marL="285750" indent="-285750">
+              <a:buFont typeface="Arial" panose="020B0604020202020204" pitchFamily="34" charset="0"/>
+              <a:buChar char="•"/>
+            </a:pPr>
+            <a:r>
+              <a:rPr lang="ru-RU" sz="2000" dirty="0" smtClean="0">
+                <a:solidFill>
+                  <a:sysClr val="windowText" lastClr="000000"/>
+                </a:solidFill>
+              </a:rPr>
+              <a:t>Все еще невозможно отследить ошибки памяти</a:t>
+            </a:r>
+          </a:p>
+          <a:p>
+            <a:pPr marL="285750" indent="-285750">
+              <a:buFont typeface="Arial" panose="020B0604020202020204" pitchFamily="34" charset="0"/>
+              <a:buChar char="•"/>
+            </a:pPr>
+            <a:endParaRPr lang="ru-RU" sz="2000" dirty="0" smtClean="0">
+              <a:solidFill>
+                <a:sysClr val="windowText" lastClr="000000"/>
+              </a:solidFill>
+            </a:endParaRPr>
+          </a:p>
+          <a:p>
+            <a:pPr marL="285750" indent="-285750">
+              <a:buFont typeface="Arial" panose="020B0604020202020204" pitchFamily="34" charset="0"/>
+              <a:buChar char="•"/>
+            </a:pPr>
+            <a:r>
+              <a:rPr lang="ru-RU" sz="2000" dirty="0" smtClean="0">
+                <a:solidFill>
+                  <a:sysClr val="windowText" lastClr="000000"/>
+                </a:solidFill>
+              </a:rPr>
+              <a:t>Требуется написание агента, который будет запускаться внутри виртуальной машины и являться ключевым звеном, определяющим эффективность </a:t>
+            </a:r>
+            <a:r>
+              <a:rPr lang="ru-RU" sz="2000" dirty="0" err="1" smtClean="0">
+                <a:solidFill>
+                  <a:sysClr val="windowText" lastClr="000000"/>
+                </a:solidFill>
+              </a:rPr>
+              <a:t>фаззинга</a:t>
+            </a:r>
+            <a:endParaRPr lang="ru-RU" sz="2000" dirty="0">
+              <a:solidFill>
+                <a:sysClr val="windowText" lastClr="000000"/>
+              </a:solidFill>
+            </a:endParaRPr>
           </a:p>
         </p:txBody>
       </p:sp>
     </p:spTree>
     <p:extLst>
       <p:ext uri="{BB962C8B-B14F-4D97-AF65-F5344CB8AC3E}">
-        <p14:creationId xmlns:p14="http://schemas.microsoft.com/office/powerpoint/2010/main" val="757873035"/>
+        <p14:creationId xmlns:p14="http://schemas.microsoft.com/office/powerpoint/2010/main" val="3304444939"/>
       </p:ext>
     </p:extLst>
   </p:cSld>
@@ -17083,223 +18376,419 @@
           <a:chExt cx="0" cy="0"/>
         </a:xfrm>
       </p:grpSpPr>
-      <p:sp>
-        <p:nvSpPr>
-          <p:cNvPr id="3" name="Текст 3">
+      <p:pic>
+        <p:nvPicPr>
+          <p:cNvPr id="3074" name="Picture 2" descr="Выпуск новых процессоров Intel Broadwell задерживается - 4PDA"/>
+          <p:cNvPicPr>
+            <a:picLocks noChangeAspect="1" noChangeArrowheads="1"/>
+          </p:cNvPicPr>
+          <p:nvPr/>
+        </p:nvPicPr>
+        <p:blipFill>
+          <a:blip r:embed="rId2">
+            <a:extLst>
+              <a:ext uri="{28A0092B-C50C-407E-A947-70E740481C1C}">
+                <a14:useLocalDpi xmlns:a14="http://schemas.microsoft.com/office/drawing/2010/main" val="0"/>
+              </a:ext>
+            </a:extLst>
+          </a:blip>
+          <a:srcRect/>
+          <a:stretch>
+            <a:fillRect/>
+          </a:stretch>
+        </p:blipFill>
+        <p:spPr bwMode="auto">
+          <a:xfrm>
+            <a:off x="7851195" y="3406497"/>
+            <a:ext cx="4260050" cy="3195038"/>
+          </a:xfrm>
+          <a:prstGeom prst="rect">
+            <a:avLst/>
+          </a:prstGeom>
+          <a:noFill/>
+          <a:extLst>
+            <a:ext uri="{909E8E84-426E-40DD-AFC4-6F175D3DCCD1}">
+              <a14:hiddenFill xmlns:a14="http://schemas.microsoft.com/office/drawing/2010/main">
+                <a:solidFill>
+                  <a:srgbClr val="FFFFFF"/>
+                </a:solidFill>
+              </a14:hiddenFill>
+            </a:ext>
+          </a:extLst>
+        </p:spPr>
+      </p:pic>
+      <p:sp>
+        <p:nvSpPr>
+          <p:cNvPr id="2" name="Текст 1">
+            <a:extLst>
+              <a:ext uri="{FF2B5EF4-FFF2-40B4-BE49-F238E27FC236}">
+                <a16:creationId xmlns:a16="http://schemas.microsoft.com/office/drawing/2014/main" id="{34CF7266-1A7A-9629-D9A6-5784F0346D64}"/>
+              </a:ext>
+            </a:extLst>
+          </p:cNvPr>
+          <p:cNvSpPr>
+            <a:spLocks noGrp="1"/>
+          </p:cNvSpPr>
+          <p:nvPr>
+            <p:ph type="body" sz="half" idx="11"/>
+          </p:nvPr>
+        </p:nvSpPr>
+        <p:spPr/>
+        <p:txBody>
+          <a:bodyPr/>
+          <a:lstStyle/>
+          <a:p>
+            <a:r>
+              <a:rPr lang="en-US" dirty="0" smtClean="0"/>
+              <a:t>Intel Processor Tracing</a:t>
+            </a:r>
+            <a:endParaRPr lang="ru-RU" dirty="0"/>
+          </a:p>
+        </p:txBody>
+      </p:sp>
+      <p:sp>
+        <p:nvSpPr>
+          <p:cNvPr id="4" name="Текст 3">
             <a:extLst>
               <a:ext uri="{FF2B5EF4-FFF2-40B4-BE49-F238E27FC236}">
                 <a16:creationId xmlns:a16="http://schemas.microsoft.com/office/drawing/2014/main" id="{8A2D0C14-EAD0-9B0E-6354-FD1A4344047A}"/>
               </a:ext>
             </a:extLst>
           </p:cNvPr>
-          <p:cNvSpPr txBox="1">
-            <a:spLocks/>
+          <p:cNvSpPr>
+            <a:spLocks noGrp="1"/>
           </p:cNvSpPr>
+          <p:nvPr>
+            <p:ph type="body" sz="half" idx="14"/>
+          </p:nvPr>
+        </p:nvSpPr>
+        <p:spPr/>
+        <p:txBody>
+          <a:bodyPr/>
+          <a:lstStyle/>
+          <a:p>
+            <a:r>
+              <a:rPr lang="kk-KZ" dirty="0"/>
+              <a:t>Фаззинг виртуальной машины</a:t>
+            </a:r>
+            <a:r>
+              <a:rPr lang="ru-RU" dirty="0"/>
+              <a:t>. Покрытие</a:t>
+            </a:r>
+            <a:endParaRPr lang="ru-RU" dirty="0"/>
+          </a:p>
+        </p:txBody>
+      </p:sp>
+      <p:sp>
+        <p:nvSpPr>
+          <p:cNvPr id="3" name="TextBox 2"/>
+          <p:cNvSpPr txBox="1"/>
           <p:nvPr/>
         </p:nvSpPr>
         <p:spPr>
           <a:xfrm>
-            <a:off x="5780965" y="3519010"/>
-            <a:ext cx="4815535" cy="675075"/>
-          </a:xfrm>
-          <a:prstGeom prst="rect">
-            <a:avLst/>
-          </a:prstGeom>
-        </p:spPr>
-        <p:txBody>
-          <a:bodyPr/>
-          <a:lstStyle>
-            <a:lvl1pPr marL="228600" indent="-228600" algn="l" defTabSz="914400" rtl="0" eaLnBrk="1" latinLnBrk="0" hangingPunct="1">
-              <a:lnSpc>
-                <a:spcPct val="90000"/>
-              </a:lnSpc>
-              <a:spcBef>
-                <a:spcPts val="1000"/>
-              </a:spcBef>
+            <a:off x="442912" y="1385084"/>
+            <a:ext cx="7740860" cy="3693319"/>
+          </a:xfrm>
+          <a:prstGeom prst="rect">
+            <a:avLst/>
+          </a:prstGeom>
+          <a:noFill/>
+        </p:spPr>
+        <p:txBody>
+          <a:bodyPr wrap="square" rtlCol="0">
+            <a:spAutoFit/>
+          </a:bodyPr>
+          <a:lstStyle/>
+          <a:p>
+            <a:pPr marL="285750" indent="-285750">
               <a:buFont typeface="Arial" panose="020B0604020202020204" pitchFamily="34" charset="0"/>
               <a:buChar char="•"/>
-              <a:defRPr sz="2800" kern="1200">
-                <a:solidFill>
-                  <a:schemeClr val="tx1"/>
-                </a:solidFill>
-                <a:latin typeface="+mn-lt"/>
-                <a:ea typeface="+mn-ea"/>
-                <a:cs typeface="+mn-cs"/>
-              </a:defRPr>
-            </a:lvl1pPr>
-            <a:lvl2pPr marL="685800" indent="-228600" algn="l" defTabSz="914400" rtl="0" eaLnBrk="1" latinLnBrk="0" hangingPunct="1">
-              <a:lnSpc>
-                <a:spcPct val="90000"/>
-              </a:lnSpc>
-              <a:spcBef>
-                <a:spcPts val="500"/>
-              </a:spcBef>
+            </a:pPr>
+            <a:r>
+              <a:rPr lang="ru-RU" dirty="0" err="1"/>
+              <a:t>Intel</a:t>
+            </a:r>
+            <a:r>
+              <a:rPr lang="ru-RU" dirty="0"/>
+              <a:t> </a:t>
+            </a:r>
+            <a:r>
+              <a:rPr lang="ru-RU" dirty="0" smtClean="0"/>
+              <a:t>PT </a:t>
+            </a:r>
+            <a:r>
+              <a:rPr lang="ru-RU" dirty="0"/>
+              <a:t>— это функция современных процессоров </a:t>
+            </a:r>
+            <a:r>
+              <a:rPr lang="ru-RU" dirty="0" err="1" smtClean="0"/>
+              <a:t>Intel</a:t>
+            </a:r>
+            <a:r>
+              <a:rPr lang="ru-RU" dirty="0" smtClean="0"/>
+              <a:t> начиная с 5 поколения </a:t>
+            </a:r>
+            <a:r>
+              <a:rPr lang="en-US" dirty="0" err="1" smtClean="0"/>
+              <a:t>Broadwell</a:t>
+            </a:r>
+            <a:r>
+              <a:rPr lang="en-US" dirty="0" smtClean="0"/>
+              <a:t> (2015 </a:t>
+            </a:r>
+            <a:r>
+              <a:rPr lang="ru-RU" dirty="0" smtClean="0"/>
+              <a:t>год)</a:t>
+            </a:r>
+            <a:endParaRPr lang="en-US" dirty="0" smtClean="0"/>
+          </a:p>
+          <a:p>
+            <a:pPr marL="285750" indent="-285750">
               <a:buFont typeface="Arial" panose="020B0604020202020204" pitchFamily="34" charset="0"/>
               <a:buChar char="•"/>
-              <a:defRPr sz="2400" kern="1200">
-                <a:solidFill>
-                  <a:schemeClr val="tx1"/>
-                </a:solidFill>
-                <a:latin typeface="+mn-lt"/>
-                <a:ea typeface="+mn-ea"/>
-                <a:cs typeface="+mn-cs"/>
-              </a:defRPr>
-            </a:lvl2pPr>
-            <a:lvl3pPr marL="1143000" indent="-228600" algn="l" defTabSz="914400" rtl="0" eaLnBrk="1" latinLnBrk="0" hangingPunct="1">
-              <a:lnSpc>
-                <a:spcPct val="90000"/>
-              </a:lnSpc>
-              <a:spcBef>
-                <a:spcPts val="500"/>
-              </a:spcBef>
+            </a:pPr>
+            <a:endParaRPr lang="en-US" dirty="0"/>
+          </a:p>
+          <a:p>
+            <a:pPr marL="285750" indent="-285750">
               <a:buFont typeface="Arial" panose="020B0604020202020204" pitchFamily="34" charset="0"/>
               <a:buChar char="•"/>
-              <a:defRPr sz="2000" kern="1200">
-                <a:solidFill>
-                  <a:schemeClr val="tx1"/>
-                </a:solidFill>
-                <a:latin typeface="+mn-lt"/>
-                <a:ea typeface="+mn-ea"/>
-                <a:cs typeface="+mn-cs"/>
-              </a:defRPr>
-            </a:lvl3pPr>
-            <a:lvl4pPr marL="1600200" indent="-228600" algn="l" defTabSz="914400" rtl="0" eaLnBrk="1" latinLnBrk="0" hangingPunct="1">
-              <a:lnSpc>
-                <a:spcPct val="90000"/>
-              </a:lnSpc>
-              <a:spcBef>
-                <a:spcPts val="500"/>
-              </a:spcBef>
+            </a:pPr>
+            <a:r>
+              <a:rPr lang="ru-RU" dirty="0" err="1"/>
+              <a:t>Intel</a:t>
+            </a:r>
+            <a:r>
+              <a:rPr lang="ru-RU" dirty="0"/>
+              <a:t> PT позволяет получить полный поток исполнения </a:t>
+            </a:r>
+            <a:r>
+              <a:rPr lang="ru-RU" dirty="0" smtClean="0"/>
+              <a:t>отлаживаемого </a:t>
+            </a:r>
+            <a:r>
+              <a:rPr lang="ru-RU" dirty="0"/>
+              <a:t>приложения с минимальным </a:t>
+            </a:r>
+            <a:r>
+              <a:rPr lang="ru-RU" dirty="0" err="1"/>
+              <a:t>оверхедом</a:t>
+            </a:r>
+            <a:r>
+              <a:rPr lang="ru-RU" dirty="0"/>
+              <a:t> (&lt;5%). При этом она поддерживает </a:t>
+            </a:r>
+            <a:r>
+              <a:rPr lang="ru-RU" dirty="0" err="1"/>
+              <a:t>многопоточность</a:t>
+            </a:r>
+            <a:r>
+              <a:rPr lang="ru-RU" dirty="0"/>
+              <a:t> и может помочь в установлении ошибок типа "состояние </a:t>
+            </a:r>
+            <a:r>
+              <a:rPr lang="ru-RU" dirty="0" smtClean="0"/>
+              <a:t>гонки</a:t>
+            </a:r>
+            <a:r>
+              <a:rPr lang="en-US" dirty="0" smtClean="0"/>
+              <a:t> </a:t>
+            </a:r>
+            <a:r>
+              <a:rPr lang="ru-RU" dirty="0" smtClean="0"/>
+              <a:t>благодаря </a:t>
+            </a:r>
+            <a:r>
+              <a:rPr lang="ru-RU" dirty="0"/>
+              <a:t>отметкам времени при записи трассы </a:t>
+            </a:r>
+            <a:r>
+              <a:rPr lang="ru-RU" dirty="0" smtClean="0"/>
+              <a:t>приложения</a:t>
+            </a:r>
+          </a:p>
+          <a:p>
+            <a:pPr marL="285750" indent="-285750">
               <a:buFont typeface="Arial" panose="020B0604020202020204" pitchFamily="34" charset="0"/>
               <a:buChar char="•"/>
-              <a:defRPr sz="1800" kern="1200">
-                <a:solidFill>
-                  <a:schemeClr val="tx1"/>
-                </a:solidFill>
-                <a:latin typeface="+mn-lt"/>
-                <a:ea typeface="+mn-ea"/>
-                <a:cs typeface="+mn-cs"/>
-              </a:defRPr>
-            </a:lvl4pPr>
-            <a:lvl5pPr marL="2057400" indent="-228600" algn="l" defTabSz="914400" rtl="0" eaLnBrk="1" latinLnBrk="0" hangingPunct="1">
-              <a:lnSpc>
-                <a:spcPct val="90000"/>
-              </a:lnSpc>
-              <a:spcBef>
-                <a:spcPts val="500"/>
-              </a:spcBef>
+            </a:pPr>
+            <a:endParaRPr lang="ru-RU" dirty="0"/>
+          </a:p>
+          <a:p>
+            <a:pPr marL="285750" indent="-285750">
               <a:buFont typeface="Arial" panose="020B0604020202020204" pitchFamily="34" charset="0"/>
               <a:buChar char="•"/>
-              <a:defRPr sz="1800" kern="1200">
-                <a:solidFill>
-                  <a:schemeClr val="tx1"/>
-                </a:solidFill>
-                <a:latin typeface="+mn-lt"/>
-                <a:ea typeface="+mn-ea"/>
-                <a:cs typeface="+mn-cs"/>
-              </a:defRPr>
-            </a:lvl5pPr>
-            <a:lvl6pPr marL="2514600" indent="-228600" algn="l" defTabSz="914400" rtl="0" eaLnBrk="1" latinLnBrk="0" hangingPunct="1">
-              <a:lnSpc>
-                <a:spcPct val="90000"/>
-              </a:lnSpc>
-              <a:spcBef>
-                <a:spcPts val="500"/>
-              </a:spcBef>
-              <a:buFont typeface="Arial" panose="020B0604020202020204" pitchFamily="34" charset="0"/>
-              <a:buChar char="•"/>
-              <a:defRPr sz="1800" kern="1200">
-                <a:solidFill>
-                  <a:schemeClr val="tx1"/>
-                </a:solidFill>
-                <a:latin typeface="+mn-lt"/>
-                <a:ea typeface="+mn-ea"/>
-                <a:cs typeface="+mn-cs"/>
-              </a:defRPr>
-            </a:lvl6pPr>
-            <a:lvl7pPr marL="2971800" indent="-228600" algn="l" defTabSz="914400" rtl="0" eaLnBrk="1" latinLnBrk="0" hangingPunct="1">
-              <a:lnSpc>
-                <a:spcPct val="90000"/>
-              </a:lnSpc>
-              <a:spcBef>
-                <a:spcPts val="500"/>
-              </a:spcBef>
-              <a:buFont typeface="Arial" panose="020B0604020202020204" pitchFamily="34" charset="0"/>
-              <a:buChar char="•"/>
-              <a:defRPr sz="1800" kern="1200">
-                <a:solidFill>
-                  <a:schemeClr val="tx1"/>
-                </a:solidFill>
-                <a:latin typeface="+mn-lt"/>
-                <a:ea typeface="+mn-ea"/>
-                <a:cs typeface="+mn-cs"/>
-              </a:defRPr>
-            </a:lvl7pPr>
-            <a:lvl8pPr marL="3429000" indent="-228600" algn="l" defTabSz="914400" rtl="0" eaLnBrk="1" latinLnBrk="0" hangingPunct="1">
-              <a:lnSpc>
-                <a:spcPct val="90000"/>
-              </a:lnSpc>
-              <a:spcBef>
-                <a:spcPts val="500"/>
-              </a:spcBef>
-              <a:buFont typeface="Arial" panose="020B0604020202020204" pitchFamily="34" charset="0"/>
-              <a:buChar char="•"/>
-              <a:defRPr sz="1800" kern="1200">
-                <a:solidFill>
-                  <a:schemeClr val="tx1"/>
-                </a:solidFill>
-                <a:latin typeface="+mn-lt"/>
-                <a:ea typeface="+mn-ea"/>
-                <a:cs typeface="+mn-cs"/>
-              </a:defRPr>
-            </a:lvl8pPr>
-            <a:lvl9pPr marL="3886200" indent="-228600" algn="l" defTabSz="914400" rtl="0" eaLnBrk="1" latinLnBrk="0" hangingPunct="1">
-              <a:lnSpc>
-                <a:spcPct val="90000"/>
-              </a:lnSpc>
-              <a:spcBef>
-                <a:spcPts val="500"/>
-              </a:spcBef>
-              <a:buFont typeface="Arial" panose="020B0604020202020204" pitchFamily="34" charset="0"/>
-              <a:buChar char="•"/>
-              <a:defRPr sz="1800" kern="1200">
-                <a:solidFill>
-                  <a:schemeClr val="tx1"/>
-                </a:solidFill>
-                <a:latin typeface="+mn-lt"/>
-                <a:ea typeface="+mn-ea"/>
-                <a:cs typeface="+mn-cs"/>
-              </a:defRPr>
-            </a:lvl9pPr>
-          </a:lstStyle>
-          <a:p>
-            <a:pPr marL="0" indent="0">
-              <a:buNone/>
             </a:pPr>
             <a:r>
-              <a:rPr lang="ru-RU" sz="3200" b="1" dirty="0" smtClean="0">
-                <a:solidFill>
-                  <a:schemeClr val="bg1"/>
-                </a:solidFill>
-                <a:latin typeface="Segoe UI Semilight" panose="020B0402040204020203" pitchFamily="34" charset="0"/>
-                <a:cs typeface="Segoe UI Semilight" panose="020B0402040204020203" pitchFamily="34" charset="0"/>
-              </a:rPr>
-              <a:t>Спасибо за внимание!</a:t>
-            </a:r>
-            <a:endParaRPr lang="ru-RU" sz="3200" b="1" dirty="0">
-              <a:solidFill>
-                <a:schemeClr val="bg1"/>
-              </a:solidFill>
-              <a:latin typeface="Segoe UI Semilight" panose="020B0402040204020203" pitchFamily="34" charset="0"/>
-              <a:cs typeface="Segoe UI Semilight" panose="020B0402040204020203" pitchFamily="34" charset="0"/>
-            </a:endParaRPr>
+              <a:rPr lang="ru-RU" dirty="0" smtClean="0"/>
+              <a:t>Когда </a:t>
+            </a:r>
+            <a:r>
+              <a:rPr lang="ru-RU" dirty="0"/>
+              <a:t>цель </a:t>
+            </a:r>
+            <a:r>
+              <a:rPr lang="ru-RU" dirty="0" err="1"/>
+              <a:t>фаззится</a:t>
+            </a:r>
+            <a:r>
+              <a:rPr lang="ru-RU" dirty="0"/>
+              <a:t> в режиме </a:t>
+            </a:r>
+            <a:r>
+              <a:rPr lang="ru-RU" dirty="0" err="1"/>
+              <a:t>Intel</a:t>
+            </a:r>
+            <a:r>
+              <a:rPr lang="ru-RU" dirty="0"/>
+              <a:t> PT, она открывается в отладчике. Перед каждой итерацией отладчик включает трассировку </a:t>
+            </a:r>
+            <a:r>
+              <a:rPr lang="ru-RU" dirty="0" err="1"/>
+              <a:t>Intel</a:t>
+            </a:r>
+            <a:r>
+              <a:rPr lang="ru-RU" dirty="0"/>
+              <a:t> PT для целевого процесса, а после завершения итерации трассировка извлекается и анализируется, обновляя карту </a:t>
+            </a:r>
+            <a:r>
+              <a:rPr lang="ru-RU" dirty="0" smtClean="0"/>
+              <a:t>покрытия</a:t>
+            </a:r>
+            <a:endParaRPr lang="ru-RU" dirty="0"/>
           </a:p>
         </p:txBody>
       </p:sp>
     </p:spTree>
     <p:extLst>
       <p:ext uri="{BB962C8B-B14F-4D97-AF65-F5344CB8AC3E}">
-        <p14:creationId xmlns:p14="http://schemas.microsoft.com/office/powerpoint/2010/main" val="2203234034"/>
+        <p14:creationId xmlns:p14="http://schemas.microsoft.com/office/powerpoint/2010/main" val="3595810813"/>
+      </p:ext>
+    </p:extLst>
+  </p:cSld>
+  <p:clrMapOvr>
+    <a:masterClrMapping/>
+  </p:clrMapOvr>
+  <p:timing>
+    <p:tnLst>
+      <p:par>
+        <p:cTn id="1" dur="indefinite" restart="never" nodeType="tmRoot"/>
+      </p:par>
+    </p:tnLst>
+  </p:timing>
+</p:sld>
+</file>
+
+<file path=ppt/slides/slide9.xml><?xml version="1.0" encoding="utf-8"?>
+<p:sld xmlns:a="http://schemas.openxmlformats.org/drawingml/2006/main" xmlns:r="http://schemas.openxmlformats.org/officeDocument/2006/relationships" xmlns:p="http://schemas.openxmlformats.org/presentationml/2006/main">
+  <p:cSld>
+    <p:spTree>
+      <p:nvGrpSpPr>
+        <p:cNvPr id="1" name=""/>
+        <p:cNvGrpSpPr/>
+        <p:nvPr/>
+      </p:nvGrpSpPr>
+      <p:grpSpPr>
+        <a:xfrm>
+          <a:off x="0" y="0"/>
+          <a:ext cx="0" cy="0"/>
+          <a:chOff x="0" y="0"/>
+          <a:chExt cx="0" cy="0"/>
+        </a:xfrm>
+      </p:grpSpPr>
+      <p:sp>
+        <p:nvSpPr>
+          <p:cNvPr id="2" name="Текст 1">
+            <a:extLst>
+              <a:ext uri="{FF2B5EF4-FFF2-40B4-BE49-F238E27FC236}">
+                <a16:creationId xmlns:a16="http://schemas.microsoft.com/office/drawing/2014/main" id="{34CF7266-1A7A-9629-D9A6-5784F0346D64}"/>
+              </a:ext>
+            </a:extLst>
+          </p:cNvPr>
+          <p:cNvSpPr>
+            <a:spLocks noGrp="1"/>
+          </p:cNvSpPr>
+          <p:nvPr>
+            <p:ph type="body" sz="half" idx="11"/>
+          </p:nvPr>
+        </p:nvSpPr>
+        <p:spPr/>
+        <p:txBody>
+          <a:bodyPr/>
+          <a:lstStyle/>
+          <a:p>
+            <a:r>
+              <a:rPr lang="ru-RU" dirty="0" smtClean="0"/>
+              <a:t>ЗАГОЛОВОК</a:t>
+            </a:r>
+            <a:endParaRPr lang="ru-RU" dirty="0"/>
+          </a:p>
+        </p:txBody>
+      </p:sp>
+      <p:sp>
+        <p:nvSpPr>
+          <p:cNvPr id="4" name="Текст 3">
+            <a:extLst>
+              <a:ext uri="{FF2B5EF4-FFF2-40B4-BE49-F238E27FC236}">
+                <a16:creationId xmlns:a16="http://schemas.microsoft.com/office/drawing/2014/main" id="{8A2D0C14-EAD0-9B0E-6354-FD1A4344047A}"/>
+              </a:ext>
+            </a:extLst>
+          </p:cNvPr>
+          <p:cNvSpPr>
+            <a:spLocks noGrp="1"/>
+          </p:cNvSpPr>
+          <p:nvPr>
+            <p:ph type="body" sz="half" idx="14"/>
+          </p:nvPr>
+        </p:nvSpPr>
+        <p:spPr/>
+        <p:txBody>
+          <a:bodyPr/>
+          <a:lstStyle/>
+          <a:p>
+            <a:r>
+              <a:rPr lang="kk-KZ" dirty="0" smtClean="0"/>
+              <a:t>Фаззинг виртуальной машины</a:t>
+            </a:r>
+            <a:r>
+              <a:rPr lang="ru-RU" dirty="0" smtClean="0"/>
+              <a:t>. Покрытие</a:t>
+            </a:r>
+            <a:endParaRPr lang="ru-RU" dirty="0"/>
+          </a:p>
+        </p:txBody>
+      </p:sp>
+      <p:sp>
+        <p:nvSpPr>
+          <p:cNvPr id="3" name="TextBox 2"/>
+          <p:cNvSpPr txBox="1"/>
+          <p:nvPr/>
+        </p:nvSpPr>
+        <p:spPr>
+          <a:xfrm>
+            <a:off x="1820525" y="2303875"/>
+            <a:ext cx="3375375" cy="2835315"/>
+          </a:xfrm>
+          <a:prstGeom prst="rect">
+            <a:avLst/>
+          </a:prstGeom>
+          <a:noFill/>
+        </p:spPr>
+        <p:txBody>
+          <a:bodyPr wrap="square" rtlCol="0">
+            <a:spAutoFit/>
+          </a:bodyPr>
+          <a:lstStyle/>
+          <a:p>
+            <a:endParaRPr lang="ru-RU" dirty="0"/>
+          </a:p>
+        </p:txBody>
+      </p:sp>
+    </p:spTree>
+    <p:extLst>
+      <p:ext uri="{BB962C8B-B14F-4D97-AF65-F5344CB8AC3E}">
+        <p14:creationId xmlns:p14="http://schemas.microsoft.com/office/powerpoint/2010/main" val="1741556976"/>
       </p:ext>
     </p:extLst>
   </p:cSld>

</xml_diff>

<commit_message>
triforceafl, elf info added
</commit_message>
<xml_diff>
--- a/Belikov_Virtual_machine_fuzzing_types_and_approaches.pptx
+++ b/Belikov_Virtual_machine_fuzzing_types_and_approaches.pptx
@@ -5,10 +5,10 @@
     <p:sldMasterId id="2147483648" r:id="rId1"/>
   </p:sldMasterIdLst>
   <p:notesMasterIdLst>
-    <p:notesMasterId r:id="rId15"/>
+    <p:notesMasterId r:id="rId17"/>
   </p:notesMasterIdLst>
   <p:handoutMasterIdLst>
-    <p:handoutMasterId r:id="rId16"/>
+    <p:handoutMasterId r:id="rId18"/>
   </p:handoutMasterIdLst>
   <p:sldIdLst>
     <p:sldId id="256" r:id="rId2"/>
@@ -16,14 +16,16 @@
     <p:sldId id="336" r:id="rId4"/>
     <p:sldId id="340" r:id="rId5"/>
     <p:sldId id="341" r:id="rId6"/>
-    <p:sldId id="343" r:id="rId7"/>
-    <p:sldId id="342" r:id="rId8"/>
-    <p:sldId id="345" r:id="rId9"/>
-    <p:sldId id="344" r:id="rId10"/>
-    <p:sldId id="339" r:id="rId11"/>
-    <p:sldId id="338" r:id="rId12"/>
-    <p:sldId id="337" r:id="rId13"/>
-    <p:sldId id="260" r:id="rId14"/>
+    <p:sldId id="348" r:id="rId7"/>
+    <p:sldId id="343" r:id="rId8"/>
+    <p:sldId id="347" r:id="rId9"/>
+    <p:sldId id="346" r:id="rId10"/>
+    <p:sldId id="345" r:id="rId11"/>
+    <p:sldId id="342" r:id="rId12"/>
+    <p:sldId id="339" r:id="rId13"/>
+    <p:sldId id="338" r:id="rId14"/>
+    <p:sldId id="337" r:id="rId15"/>
+    <p:sldId id="260" r:id="rId16"/>
   </p:sldIdLst>
   <p:sldSz cx="12192000" cy="6858000"/>
   <p:notesSz cx="6858000" cy="9144000"/>
@@ -15547,9 +15549,10 @@
           <a:lstStyle/>
           <a:p>
             <a:r>
-              <a:rPr lang="ru-RU" dirty="0"/>
-              <a:t>ССЫЛКИ</a:t>
-            </a:r>
+              <a:rPr lang="en-US" dirty="0" smtClean="0"/>
+              <a:t>Intel Processor Tracing</a:t>
+            </a:r>
+            <a:endParaRPr lang="ru-RU" dirty="0"/>
           </a:p>
         </p:txBody>
       </p:sp>
@@ -15575,9 +15578,14 @@
           <a:lstStyle/>
           <a:p>
             <a:r>
+              <a:rPr lang="kk-KZ" dirty="0"/>
+              <a:t>Фаззинг виртуальной машины</a:t>
+            </a:r>
+            <a:r>
               <a:rPr lang="ru-RU" dirty="0"/>
-              <a:t>Заключение</a:t>
-            </a:r>
+              <a:t>. Покрытие</a:t>
+            </a:r>
+            <a:endParaRPr lang="ru-RU" dirty="0"/>
           </a:p>
         </p:txBody>
       </p:sp>
@@ -15589,8 +15597,8 @@
         </p:nvSpPr>
         <p:spPr>
           <a:xfrm>
-            <a:off x="5015880" y="2933945"/>
-            <a:ext cx="1170130" cy="369332"/>
+            <a:off x="442912" y="1385084"/>
+            <a:ext cx="11323718" cy="2585323"/>
           </a:xfrm>
           <a:prstGeom prst="rect">
             <a:avLst/>
@@ -15603,18 +15611,198 @@
           </a:bodyPr>
           <a:lstStyle/>
           <a:p>
+            <a:pPr marL="285750" indent="-285750">
+              <a:buFont typeface="Arial" panose="020B0604020202020204" pitchFamily="34" charset="0"/>
+              <a:buChar char="•"/>
+            </a:pPr>
+            <a:r>
+              <a:rPr lang="ru-RU" dirty="0" err="1"/>
+              <a:t>Intel</a:t>
+            </a:r>
+            <a:r>
+              <a:rPr lang="ru-RU" dirty="0"/>
+              <a:t> </a:t>
+            </a:r>
+            <a:r>
+              <a:rPr lang="ru-RU" dirty="0" smtClean="0"/>
+              <a:t>PT </a:t>
+            </a:r>
+            <a:r>
+              <a:rPr lang="ru-RU" dirty="0"/>
+              <a:t>— это функция современных процессоров </a:t>
+            </a:r>
+            <a:r>
+              <a:rPr lang="ru-RU" dirty="0" err="1" smtClean="0"/>
+              <a:t>Intel</a:t>
+            </a:r>
+            <a:r>
+              <a:rPr lang="ru-RU" dirty="0" smtClean="0"/>
+              <a:t> начиная с 5 поколения </a:t>
+            </a:r>
+            <a:r>
+              <a:rPr lang="en-US" dirty="0" err="1" smtClean="0"/>
+              <a:t>Broadwell</a:t>
+            </a:r>
             <a:r>
               <a:rPr lang="en-US" dirty="0" smtClean="0"/>
-              <a:t>QR here</a:t>
-            </a:r>
+              <a:t> (2015 </a:t>
+            </a:r>
+            <a:r>
+              <a:rPr lang="ru-RU" dirty="0" smtClean="0"/>
+              <a:t>год)</a:t>
+            </a:r>
+            <a:endParaRPr lang="en-US" dirty="0" smtClean="0"/>
+          </a:p>
+          <a:p>
+            <a:pPr marL="285750" indent="-285750">
+              <a:buFont typeface="Arial" panose="020B0604020202020204" pitchFamily="34" charset="0"/>
+              <a:buChar char="•"/>
+            </a:pPr>
+            <a:endParaRPr lang="en-US" dirty="0"/>
+          </a:p>
+          <a:p>
+            <a:pPr marL="285750" indent="-285750">
+              <a:buFont typeface="Arial" panose="020B0604020202020204" pitchFamily="34" charset="0"/>
+              <a:buChar char="•"/>
+            </a:pPr>
+            <a:r>
+              <a:rPr lang="ru-RU" dirty="0" err="1"/>
+              <a:t>Intel</a:t>
+            </a:r>
+            <a:r>
+              <a:rPr lang="ru-RU" dirty="0"/>
+              <a:t> PT позволяет получить полный поток исполнения </a:t>
+            </a:r>
+            <a:r>
+              <a:rPr lang="ru-RU" dirty="0" smtClean="0"/>
+              <a:t>отлаживаемого </a:t>
+            </a:r>
+            <a:r>
+              <a:rPr lang="ru-RU" dirty="0"/>
+              <a:t>приложения с минимальным </a:t>
+            </a:r>
+            <a:r>
+              <a:rPr lang="ru-RU" dirty="0" err="1"/>
+              <a:t>оверхедом</a:t>
+            </a:r>
+            <a:r>
+              <a:rPr lang="ru-RU" dirty="0"/>
+              <a:t> (&lt;5%). При этом она поддерживает </a:t>
+            </a:r>
+            <a:r>
+              <a:rPr lang="ru-RU" dirty="0" err="1"/>
+              <a:t>многопоточность</a:t>
+            </a:r>
+            <a:r>
+              <a:rPr lang="ru-RU" dirty="0"/>
+              <a:t> и может помочь в установлении ошибок типа "состояние </a:t>
+            </a:r>
+            <a:r>
+              <a:rPr lang="ru-RU" dirty="0" smtClean="0"/>
+              <a:t>гонки</a:t>
+            </a:r>
+            <a:r>
+              <a:rPr lang="en-US" dirty="0" smtClean="0"/>
+              <a:t> </a:t>
+            </a:r>
+            <a:r>
+              <a:rPr lang="ru-RU" dirty="0" smtClean="0"/>
+              <a:t>благодаря </a:t>
+            </a:r>
+            <a:r>
+              <a:rPr lang="ru-RU" dirty="0"/>
+              <a:t>отметкам времени при записи трассы </a:t>
+            </a:r>
+            <a:r>
+              <a:rPr lang="ru-RU" dirty="0" smtClean="0"/>
+              <a:t>приложения</a:t>
+            </a:r>
+          </a:p>
+          <a:p>
+            <a:pPr marL="285750" indent="-285750">
+              <a:buFont typeface="Arial" panose="020B0604020202020204" pitchFamily="34" charset="0"/>
+              <a:buChar char="•"/>
+            </a:pPr>
             <a:endParaRPr lang="ru-RU" dirty="0"/>
           </a:p>
-        </p:txBody>
-      </p:sp>
+          <a:p>
+            <a:pPr marL="285750" indent="-285750">
+              <a:buFont typeface="Arial" panose="020B0604020202020204" pitchFamily="34" charset="0"/>
+              <a:buChar char="•"/>
+            </a:pPr>
+            <a:r>
+              <a:rPr lang="ru-RU" dirty="0" smtClean="0"/>
+              <a:t>Когда </a:t>
+            </a:r>
+            <a:r>
+              <a:rPr lang="ru-RU" dirty="0"/>
+              <a:t>цель </a:t>
+            </a:r>
+            <a:r>
+              <a:rPr lang="ru-RU" dirty="0" err="1"/>
+              <a:t>фаззится</a:t>
+            </a:r>
+            <a:r>
+              <a:rPr lang="ru-RU" dirty="0"/>
+              <a:t> в режиме </a:t>
+            </a:r>
+            <a:r>
+              <a:rPr lang="ru-RU" dirty="0" err="1"/>
+              <a:t>Intel</a:t>
+            </a:r>
+            <a:r>
+              <a:rPr lang="ru-RU" dirty="0"/>
+              <a:t> PT, она открывается в отладчике. Перед каждой итерацией отладчик включает трассировку </a:t>
+            </a:r>
+            <a:r>
+              <a:rPr lang="ru-RU" dirty="0" err="1"/>
+              <a:t>Intel</a:t>
+            </a:r>
+            <a:r>
+              <a:rPr lang="ru-RU" dirty="0"/>
+              <a:t> PT для целевого процесса, а после завершения итерации трассировка извлекается и анализируется, обновляя карту </a:t>
+            </a:r>
+            <a:r>
+              <a:rPr lang="ru-RU" dirty="0" smtClean="0"/>
+              <a:t>покрытия</a:t>
+            </a:r>
+            <a:endParaRPr lang="ru-RU" dirty="0"/>
+          </a:p>
+        </p:txBody>
+      </p:sp>
+      <p:pic>
+        <p:nvPicPr>
+          <p:cNvPr id="5" name="Рисунок 4"/>
+          <p:cNvPicPr>
+            <a:picLocks noChangeAspect="1"/>
+          </p:cNvPicPr>
+          <p:nvPr/>
+        </p:nvPicPr>
+        <p:blipFill>
+          <a:blip r:embed="rId2"/>
+          <a:stretch>
+            <a:fillRect/>
+          </a:stretch>
+        </p:blipFill>
+        <p:spPr>
+          <a:xfrm>
+            <a:off x="2237621" y="4174839"/>
+            <a:ext cx="7734300" cy="2371725"/>
+          </a:xfrm>
+          <a:prstGeom prst="rect">
+            <a:avLst/>
+          </a:prstGeom>
+          <a:ln w="57150">
+            <a:solidFill>
+              <a:srgbClr val="005096"/>
+            </a:solidFill>
+          </a:ln>
+        </p:spPr>
+      </p:pic>
     </p:spTree>
     <p:extLst>
       <p:ext uri="{BB962C8B-B14F-4D97-AF65-F5344CB8AC3E}">
-        <p14:creationId xmlns:p14="http://schemas.microsoft.com/office/powerpoint/2010/main" val="2906767701"/>
+        <p14:creationId xmlns:p14="http://schemas.microsoft.com/office/powerpoint/2010/main" val="3595810813"/>
       </p:ext>
     </p:extLst>
   </p:cSld>
@@ -15664,14 +15852,19 @@
             <p:ph type="body" sz="half" idx="11"/>
           </p:nvPr>
         </p:nvSpPr>
-        <p:spPr/>
+        <p:spPr>
+          <a:xfrm>
+            <a:off x="442912" y="818710"/>
+            <a:ext cx="9974262" cy="381000"/>
+          </a:xfrm>
+        </p:spPr>
         <p:txBody>
           <a:bodyPr/>
           <a:lstStyle/>
           <a:p>
             <a:r>
               <a:rPr lang="ru-RU" dirty="0" smtClean="0"/>
-              <a:t>ЗАГОЛОВОК</a:t>
+              <a:t>НЕДОСТАТКИ</a:t>
             </a:r>
             <a:endParaRPr lang="ru-RU" dirty="0"/>
           </a:p>
@@ -15699,17 +15892,236 @@
           <a:lstStyle/>
           <a:p>
             <a:r>
-              <a:rPr lang="ru-RU" dirty="0" smtClean="0"/>
-              <a:t>Раздел</a:t>
-            </a:r>
-            <a:endParaRPr lang="ru-RU" dirty="0"/>
+              <a:rPr lang="kk-KZ" dirty="0">
+                <a:solidFill>
+                  <a:sysClr val="windowText" lastClr="000000"/>
+                </a:solidFill>
+              </a:rPr>
+              <a:t>Фаззинг виртуальной </a:t>
+            </a:r>
+            <a:r>
+              <a:rPr lang="kk-KZ" dirty="0" smtClean="0">
+                <a:solidFill>
+                  <a:sysClr val="windowText" lastClr="000000"/>
+                </a:solidFill>
+              </a:rPr>
+              <a:t>машины</a:t>
+            </a:r>
+            <a:endParaRPr lang="ru-RU" dirty="0">
+              <a:solidFill>
+                <a:sysClr val="windowText" lastClr="000000"/>
+              </a:solidFill>
+            </a:endParaRPr>
+          </a:p>
+        </p:txBody>
+      </p:sp>
+      <p:sp>
+        <p:nvSpPr>
+          <p:cNvPr id="5" name="TextBox 4"/>
+          <p:cNvSpPr txBox="1"/>
+          <p:nvPr/>
+        </p:nvSpPr>
+        <p:spPr>
+          <a:xfrm>
+            <a:off x="442912" y="1382939"/>
+            <a:ext cx="8578413" cy="4401205"/>
+          </a:xfrm>
+          <a:prstGeom prst="rect">
+            <a:avLst/>
+          </a:prstGeom>
+          <a:noFill/>
+        </p:spPr>
+        <p:txBody>
+          <a:bodyPr wrap="square" rtlCol="0">
+            <a:spAutoFit/>
+          </a:bodyPr>
+          <a:lstStyle/>
+          <a:p>
+            <a:pPr marL="285750" indent="-285750">
+              <a:buFont typeface="Arial" panose="020B0604020202020204" pitchFamily="34" charset="0"/>
+              <a:buChar char="•"/>
+            </a:pPr>
+            <a:r>
+              <a:rPr lang="ru-RU" sz="2000" dirty="0" smtClean="0">
+                <a:solidFill>
+                  <a:sysClr val="windowText" lastClr="000000"/>
+                </a:solidFill>
+              </a:rPr>
+              <a:t>Отсутствие </a:t>
+            </a:r>
+            <a:r>
+              <a:rPr lang="ru-RU" sz="2000" dirty="0" err="1" smtClean="0">
+                <a:solidFill>
+                  <a:sysClr val="windowText" lastClr="000000"/>
+                </a:solidFill>
+              </a:rPr>
+              <a:t>инструментации</a:t>
+            </a:r>
+            <a:r>
+              <a:rPr lang="ru-RU" sz="2000" dirty="0" smtClean="0">
+                <a:solidFill>
+                  <a:sysClr val="windowText" lastClr="000000"/>
+                </a:solidFill>
+              </a:rPr>
+              <a:t> не позволяет отследить ошибочные обращения к памяти</a:t>
+            </a:r>
+          </a:p>
+          <a:p>
+            <a:pPr marL="285750" indent="-285750">
+              <a:buFont typeface="Arial" panose="020B0604020202020204" pitchFamily="34" charset="0"/>
+              <a:buChar char="•"/>
+            </a:pPr>
+            <a:endParaRPr lang="ru-RU" sz="2000" dirty="0" smtClean="0">
+              <a:solidFill>
+                <a:sysClr val="windowText" lastClr="000000"/>
+              </a:solidFill>
+            </a:endParaRPr>
+          </a:p>
+          <a:p>
+            <a:pPr marL="285750" indent="-285750">
+              <a:buFont typeface="Arial" panose="020B0604020202020204" pitchFamily="34" charset="0"/>
+              <a:buChar char="•"/>
+            </a:pPr>
+            <a:r>
+              <a:rPr lang="ru-RU" sz="2000" dirty="0" smtClean="0">
+                <a:solidFill>
+                  <a:sysClr val="windowText" lastClr="000000"/>
+                </a:solidFill>
+              </a:rPr>
+              <a:t>Для воспроизведения ошибки может потребоваться повторить в точности всю историю </a:t>
+            </a:r>
+            <a:r>
+              <a:rPr lang="ru-RU" sz="2000" dirty="0" err="1" smtClean="0">
+                <a:solidFill>
+                  <a:sysClr val="windowText" lastClr="000000"/>
+                </a:solidFill>
+              </a:rPr>
+              <a:t>фаззинга</a:t>
+            </a:r>
+            <a:endParaRPr lang="ru-RU" sz="2000" dirty="0" smtClean="0">
+              <a:solidFill>
+                <a:sysClr val="windowText" lastClr="000000"/>
+              </a:solidFill>
+            </a:endParaRPr>
+          </a:p>
+          <a:p>
+            <a:pPr marL="285750" indent="-285750">
+              <a:buFont typeface="Arial" panose="020B0604020202020204" pitchFamily="34" charset="0"/>
+              <a:buChar char="•"/>
+            </a:pPr>
+            <a:endParaRPr lang="ru-RU" sz="2000" dirty="0" smtClean="0">
+              <a:solidFill>
+                <a:sysClr val="windowText" lastClr="000000"/>
+              </a:solidFill>
+            </a:endParaRPr>
+          </a:p>
+          <a:p>
+            <a:pPr marL="285750" indent="-285750">
+              <a:buFont typeface="Arial" panose="020B0604020202020204" pitchFamily="34" charset="0"/>
+              <a:buChar char="•"/>
+            </a:pPr>
+            <a:r>
+              <a:rPr lang="ru-RU" sz="2000" dirty="0" smtClean="0">
+                <a:solidFill>
+                  <a:sysClr val="windowText" lastClr="000000"/>
+                </a:solidFill>
+              </a:rPr>
+              <a:t>Нивелирует этот недостаток </a:t>
+            </a:r>
+            <a:r>
+              <a:rPr lang="en-US" sz="2000" dirty="0" smtClean="0">
+                <a:solidFill>
+                  <a:sysClr val="windowText" lastClr="000000"/>
+                </a:solidFill>
+              </a:rPr>
+              <a:t>snapshot-based </a:t>
+            </a:r>
+            <a:r>
+              <a:rPr lang="kk-KZ" sz="2000" dirty="0" smtClean="0">
+                <a:solidFill>
+                  <a:sysClr val="windowText" lastClr="000000"/>
+                </a:solidFill>
+              </a:rPr>
+              <a:t>подход</a:t>
+            </a:r>
+            <a:r>
+              <a:rPr lang="ru-RU" sz="2000" dirty="0" smtClean="0">
+                <a:solidFill>
+                  <a:sysClr val="windowText" lastClr="000000"/>
+                </a:solidFill>
+              </a:rPr>
+              <a:t>, который позволяет каждый прогон запускать на дампе виртуальной машины</a:t>
+            </a:r>
+          </a:p>
+          <a:p>
+            <a:pPr marL="285750" indent="-285750">
+              <a:buFont typeface="Arial" panose="020B0604020202020204" pitchFamily="34" charset="0"/>
+              <a:buChar char="•"/>
+            </a:pPr>
+            <a:endParaRPr lang="ru-RU" sz="2000" dirty="0" smtClean="0">
+              <a:solidFill>
+                <a:sysClr val="windowText" lastClr="000000"/>
+              </a:solidFill>
+            </a:endParaRPr>
+          </a:p>
+          <a:p>
+            <a:pPr marL="285750" indent="-285750">
+              <a:buFont typeface="Arial" panose="020B0604020202020204" pitchFamily="34" charset="0"/>
+              <a:buChar char="•"/>
+            </a:pPr>
+            <a:r>
+              <a:rPr lang="ru-RU" sz="2000" dirty="0" smtClean="0">
+                <a:solidFill>
+                  <a:sysClr val="windowText" lastClr="000000"/>
+                </a:solidFill>
+              </a:rPr>
+              <a:t>Все еще невозможно отследить ошибки памяти</a:t>
+            </a:r>
+          </a:p>
+          <a:p>
+            <a:pPr marL="285750" indent="-285750">
+              <a:buFont typeface="Arial" panose="020B0604020202020204" pitchFamily="34" charset="0"/>
+              <a:buChar char="•"/>
+            </a:pPr>
+            <a:endParaRPr lang="ru-RU" sz="2000" dirty="0" smtClean="0">
+              <a:solidFill>
+                <a:sysClr val="windowText" lastClr="000000"/>
+              </a:solidFill>
+            </a:endParaRPr>
+          </a:p>
+          <a:p>
+            <a:pPr marL="285750" indent="-285750">
+              <a:buFont typeface="Arial" panose="020B0604020202020204" pitchFamily="34" charset="0"/>
+              <a:buChar char="•"/>
+            </a:pPr>
+            <a:r>
+              <a:rPr lang="ru-RU" sz="2000" dirty="0" smtClean="0">
+                <a:solidFill>
+                  <a:sysClr val="windowText" lastClr="000000"/>
+                </a:solidFill>
+              </a:rPr>
+              <a:t>Требуется написание агента, который будет запускаться внутри виртуальной машины и являться ключевым звеном, определяющим эффективность </a:t>
+            </a:r>
+            <a:r>
+              <a:rPr lang="ru-RU" sz="2000" dirty="0" err="1" smtClean="0">
+                <a:solidFill>
+                  <a:sysClr val="windowText" lastClr="000000"/>
+                </a:solidFill>
+              </a:rPr>
+              <a:t>фаззинга</a:t>
+            </a:r>
+            <a:endParaRPr lang="ru-RU" sz="2000" dirty="0">
+              <a:solidFill>
+                <a:sysClr val="windowText" lastClr="000000"/>
+              </a:solidFill>
+            </a:endParaRPr>
           </a:p>
         </p:txBody>
       </p:sp>
     </p:spTree>
     <p:extLst>
       <p:ext uri="{BB962C8B-B14F-4D97-AF65-F5344CB8AC3E}">
-        <p14:creationId xmlns:p14="http://schemas.microsoft.com/office/powerpoint/2010/main" val="421904790"/>
+        <p14:creationId xmlns:p14="http://schemas.microsoft.com/office/powerpoint/2010/main" val="3304444939"/>
       </p:ext>
     </p:extLst>
   </p:cSld>
@@ -15801,6 +16213,224 @@
       </p:sp>
       <p:sp>
         <p:nvSpPr>
+          <p:cNvPr id="3" name="TextBox 2"/>
+          <p:cNvSpPr txBox="1"/>
+          <p:nvPr/>
+        </p:nvSpPr>
+        <p:spPr>
+          <a:xfrm>
+            <a:off x="5015880" y="2933945"/>
+            <a:ext cx="1170130" cy="369332"/>
+          </a:xfrm>
+          <a:prstGeom prst="rect">
+            <a:avLst/>
+          </a:prstGeom>
+          <a:noFill/>
+        </p:spPr>
+        <p:txBody>
+          <a:bodyPr wrap="square" rtlCol="0">
+            <a:spAutoFit/>
+          </a:bodyPr>
+          <a:lstStyle/>
+          <a:p>
+            <a:r>
+              <a:rPr lang="en-US" dirty="0" smtClean="0"/>
+              <a:t>QR here</a:t>
+            </a:r>
+            <a:endParaRPr lang="ru-RU" dirty="0"/>
+          </a:p>
+        </p:txBody>
+      </p:sp>
+    </p:spTree>
+    <p:extLst>
+      <p:ext uri="{BB962C8B-B14F-4D97-AF65-F5344CB8AC3E}">
+        <p14:creationId xmlns:p14="http://schemas.microsoft.com/office/powerpoint/2010/main" val="2906767701"/>
+      </p:ext>
+    </p:extLst>
+  </p:cSld>
+  <p:clrMapOvr>
+    <a:masterClrMapping/>
+  </p:clrMapOvr>
+  <p:timing>
+    <p:tnLst>
+      <p:par>
+        <p:cTn id="1" dur="indefinite" restart="never" nodeType="tmRoot"/>
+      </p:par>
+    </p:tnLst>
+  </p:timing>
+</p:sld>
+</file>
+
+<file path=ppt/slides/slide13.xml><?xml version="1.0" encoding="utf-8"?>
+<p:sld xmlns:a="http://schemas.openxmlformats.org/drawingml/2006/main" xmlns:r="http://schemas.openxmlformats.org/officeDocument/2006/relationships" xmlns:p="http://schemas.openxmlformats.org/presentationml/2006/main">
+  <p:cSld>
+    <p:spTree>
+      <p:nvGrpSpPr>
+        <p:cNvPr id="1" name=""/>
+        <p:cNvGrpSpPr/>
+        <p:nvPr/>
+      </p:nvGrpSpPr>
+      <p:grpSpPr>
+        <a:xfrm>
+          <a:off x="0" y="0"/>
+          <a:ext cx="0" cy="0"/>
+          <a:chOff x="0" y="0"/>
+          <a:chExt cx="0" cy="0"/>
+        </a:xfrm>
+      </p:grpSpPr>
+      <p:sp>
+        <p:nvSpPr>
+          <p:cNvPr id="2" name="Текст 1">
+            <a:extLst>
+              <a:ext uri="{FF2B5EF4-FFF2-40B4-BE49-F238E27FC236}">
+                <a16:creationId xmlns:a16="http://schemas.microsoft.com/office/drawing/2014/main" id="{34CF7266-1A7A-9629-D9A6-5784F0346D64}"/>
+              </a:ext>
+            </a:extLst>
+          </p:cNvPr>
+          <p:cNvSpPr>
+            <a:spLocks noGrp="1"/>
+          </p:cNvSpPr>
+          <p:nvPr>
+            <p:ph type="body" sz="half" idx="11"/>
+          </p:nvPr>
+        </p:nvSpPr>
+        <p:spPr/>
+        <p:txBody>
+          <a:bodyPr/>
+          <a:lstStyle/>
+          <a:p>
+            <a:r>
+              <a:rPr lang="ru-RU" dirty="0" smtClean="0"/>
+              <a:t>ЗАГОЛОВОК</a:t>
+            </a:r>
+            <a:endParaRPr lang="ru-RU" dirty="0"/>
+          </a:p>
+        </p:txBody>
+      </p:sp>
+      <p:sp>
+        <p:nvSpPr>
+          <p:cNvPr id="4" name="Текст 3">
+            <a:extLst>
+              <a:ext uri="{FF2B5EF4-FFF2-40B4-BE49-F238E27FC236}">
+                <a16:creationId xmlns:a16="http://schemas.microsoft.com/office/drawing/2014/main" id="{8A2D0C14-EAD0-9B0E-6354-FD1A4344047A}"/>
+              </a:ext>
+            </a:extLst>
+          </p:cNvPr>
+          <p:cNvSpPr>
+            <a:spLocks noGrp="1"/>
+          </p:cNvSpPr>
+          <p:nvPr>
+            <p:ph type="body" sz="half" idx="14"/>
+          </p:nvPr>
+        </p:nvSpPr>
+        <p:spPr/>
+        <p:txBody>
+          <a:bodyPr/>
+          <a:lstStyle/>
+          <a:p>
+            <a:r>
+              <a:rPr lang="ru-RU" dirty="0" smtClean="0"/>
+              <a:t>Раздел</a:t>
+            </a:r>
+            <a:endParaRPr lang="ru-RU" dirty="0"/>
+          </a:p>
+        </p:txBody>
+      </p:sp>
+    </p:spTree>
+    <p:extLst>
+      <p:ext uri="{BB962C8B-B14F-4D97-AF65-F5344CB8AC3E}">
+        <p14:creationId xmlns:p14="http://schemas.microsoft.com/office/powerpoint/2010/main" val="421904790"/>
+      </p:ext>
+    </p:extLst>
+  </p:cSld>
+  <p:clrMapOvr>
+    <a:masterClrMapping/>
+  </p:clrMapOvr>
+  <p:timing>
+    <p:tnLst>
+      <p:par>
+        <p:cTn id="1" dur="indefinite" restart="never" nodeType="tmRoot"/>
+      </p:par>
+    </p:tnLst>
+  </p:timing>
+</p:sld>
+</file>
+
+<file path=ppt/slides/slide14.xml><?xml version="1.0" encoding="utf-8"?>
+<p:sld xmlns:a="http://schemas.openxmlformats.org/drawingml/2006/main" xmlns:r="http://schemas.openxmlformats.org/officeDocument/2006/relationships" xmlns:p="http://schemas.openxmlformats.org/presentationml/2006/main">
+  <p:cSld>
+    <p:spTree>
+      <p:nvGrpSpPr>
+        <p:cNvPr id="1" name=""/>
+        <p:cNvGrpSpPr/>
+        <p:nvPr/>
+      </p:nvGrpSpPr>
+      <p:grpSpPr>
+        <a:xfrm>
+          <a:off x="0" y="0"/>
+          <a:ext cx="0" cy="0"/>
+          <a:chOff x="0" y="0"/>
+          <a:chExt cx="0" cy="0"/>
+        </a:xfrm>
+      </p:grpSpPr>
+      <p:sp>
+        <p:nvSpPr>
+          <p:cNvPr id="2" name="Текст 1">
+            <a:extLst>
+              <a:ext uri="{FF2B5EF4-FFF2-40B4-BE49-F238E27FC236}">
+                <a16:creationId xmlns:a16="http://schemas.microsoft.com/office/drawing/2014/main" id="{34CF7266-1A7A-9629-D9A6-5784F0346D64}"/>
+              </a:ext>
+            </a:extLst>
+          </p:cNvPr>
+          <p:cNvSpPr>
+            <a:spLocks noGrp="1"/>
+          </p:cNvSpPr>
+          <p:nvPr>
+            <p:ph type="body" sz="half" idx="11"/>
+          </p:nvPr>
+        </p:nvSpPr>
+        <p:spPr/>
+        <p:txBody>
+          <a:bodyPr/>
+          <a:lstStyle/>
+          <a:p>
+            <a:r>
+              <a:rPr lang="ru-RU" dirty="0"/>
+              <a:t>ССЫЛКИ</a:t>
+            </a:r>
+          </a:p>
+        </p:txBody>
+      </p:sp>
+      <p:sp>
+        <p:nvSpPr>
+          <p:cNvPr id="4" name="Текст 3">
+            <a:extLst>
+              <a:ext uri="{FF2B5EF4-FFF2-40B4-BE49-F238E27FC236}">
+                <a16:creationId xmlns:a16="http://schemas.microsoft.com/office/drawing/2014/main" id="{8A2D0C14-EAD0-9B0E-6354-FD1A4344047A}"/>
+              </a:ext>
+            </a:extLst>
+          </p:cNvPr>
+          <p:cNvSpPr>
+            <a:spLocks noGrp="1"/>
+          </p:cNvSpPr>
+          <p:nvPr>
+            <p:ph type="body" sz="half" idx="14"/>
+          </p:nvPr>
+        </p:nvSpPr>
+        <p:spPr/>
+        <p:txBody>
+          <a:bodyPr/>
+          <a:lstStyle/>
+          <a:p>
+            <a:r>
+              <a:rPr lang="ru-RU" dirty="0"/>
+              <a:t>Заключение</a:t>
+            </a:r>
+          </a:p>
+        </p:txBody>
+      </p:sp>
+      <p:sp>
+        <p:nvSpPr>
           <p:cNvPr id="5" name="TextBox 4"/>
           <p:cNvSpPr txBox="1"/>
           <p:nvPr/>
@@ -15874,7 +16504,7 @@
 </p:sld>
 </file>
 
-<file path=ppt/slides/slide13.xml><?xml version="1.0" encoding="utf-8"?>
+<file path=ppt/slides/slide15.xml><?xml version="1.0" encoding="utf-8"?>
 <p:sld xmlns:a="http://schemas.openxmlformats.org/drawingml/2006/main" xmlns:r="http://schemas.openxmlformats.org/officeDocument/2006/relationships" xmlns:p="http://schemas.openxmlformats.org/presentationml/2006/main">
   <p:cSld>
     <p:spTree>
@@ -17863,8 +18493,8 @@
         </p:nvSpPr>
         <p:spPr>
           <a:xfrm>
-            <a:off x="442912" y="1382939"/>
-            <a:ext cx="8578413" cy="2616101"/>
+            <a:off x="442912" y="1403775"/>
+            <a:ext cx="8731664" cy="3970318"/>
           </a:xfrm>
           <a:prstGeom prst="rect">
             <a:avLst/>
@@ -17877,153 +18507,316 @@
           </a:bodyPr>
           <a:lstStyle/>
           <a:p>
-            <a:r>
-              <a:rPr lang="ru-RU" dirty="0"/>
-              <a:t>Также, например, если файл собран </a:t>
-            </a:r>
-            <a:r>
-              <a:rPr lang="ru-RU" dirty="0" err="1"/>
-              <a:t>toolchain</a:t>
-            </a:r>
-            <a:r>
-              <a:rPr lang="ru-RU" dirty="0"/>
-              <a:t>, использующим аппаратные </a:t>
-            </a:r>
-            <a:r>
-              <a:rPr lang="ru-RU" dirty="0" err="1"/>
-              <a:t>фичи</a:t>
-            </a:r>
-            <a:r>
-              <a:rPr lang="ru-RU" dirty="0"/>
-              <a:t> </a:t>
-            </a:r>
-            <a:r>
-              <a:rPr lang="ru-RU" dirty="0" err="1"/>
-              <a:t>SoC</a:t>
-            </a:r>
-            <a:r>
-              <a:rPr lang="ru-RU" dirty="0"/>
-              <a:t>, на котором запускается </a:t>
-            </a:r>
-            <a:r>
-              <a:rPr lang="ru-RU" dirty="0" err="1"/>
-              <a:t>бинарь</a:t>
-            </a:r>
-            <a:r>
-              <a:rPr lang="ru-RU" dirty="0"/>
-              <a:t> и который не поддерживается </a:t>
-            </a:r>
-            <a:r>
-              <a:rPr lang="ru-RU" dirty="0" err="1"/>
+            <a:pPr marL="285750" indent="-285750">
+              <a:buFont typeface="Arial" panose="020B0604020202020204" pitchFamily="34" charset="0"/>
+              <a:buChar char="•"/>
+            </a:pPr>
+            <a:r>
+              <a:rPr lang="ru-RU" dirty="0">
+                <a:solidFill>
+                  <a:sysClr val="windowText" lastClr="000000"/>
+                </a:solidFill>
+              </a:rPr>
+              <a:t>AFL/QEMU </a:t>
+            </a:r>
+            <a:r>
+              <a:rPr lang="ru-RU" dirty="0" err="1">
+                <a:solidFill>
+                  <a:sysClr val="windowText" lastClr="000000"/>
+                </a:solidFill>
+              </a:rPr>
+              <a:t>фаззинг</a:t>
+            </a:r>
+            <a:r>
+              <a:rPr lang="ru-RU" dirty="0">
+                <a:solidFill>
+                  <a:sysClr val="windowText" lastClr="000000"/>
+                </a:solidFill>
+              </a:rPr>
+              <a:t> с полной эмуляцией системы. </a:t>
+            </a:r>
+            <a:r>
+              <a:rPr lang="ru-RU" dirty="0" err="1">
+                <a:solidFill>
+                  <a:sysClr val="windowText" lastClr="000000"/>
+                </a:solidFill>
+              </a:rPr>
+              <a:t>Форк</a:t>
+            </a:r>
+            <a:r>
+              <a:rPr lang="ru-RU" dirty="0">
+                <a:solidFill>
+                  <a:sysClr val="windowText" lastClr="000000"/>
+                </a:solidFill>
+              </a:rPr>
+              <a:t> от </a:t>
+            </a:r>
+            <a:r>
+              <a:rPr lang="ru-RU" dirty="0" err="1">
+                <a:solidFill>
+                  <a:sysClr val="windowText" lastClr="000000"/>
+                </a:solidFill>
+              </a:rPr>
+              <a:t>nccgroup</a:t>
+            </a:r>
+            <a:r>
+              <a:rPr lang="ru-RU" dirty="0">
+                <a:solidFill>
+                  <a:sysClr val="windowText" lastClr="000000"/>
+                </a:solidFill>
+              </a:rPr>
+              <a:t>. Позволяет в </a:t>
+            </a:r>
+            <a:r>
+              <a:rPr lang="ru-RU" dirty="0" err="1">
+                <a:solidFill>
+                  <a:sysClr val="windowText" lastClr="000000"/>
+                </a:solidFill>
+              </a:rPr>
               <a:t>qemu</a:t>
             </a:r>
             <a:r>
-              <a:rPr lang="ru-RU" dirty="0"/>
-              <a:t>, </a:t>
-            </a:r>
-            <a:r>
-              <a:rPr lang="ru-RU" dirty="0" err="1"/>
-              <a:t>фаззинг</a:t>
-            </a:r>
-            <a:r>
-              <a:rPr lang="ru-RU" dirty="0"/>
-              <a:t> оборвется, как только встретится специфическая инструкция, или, например, будет использован специфический </a:t>
-            </a:r>
-            <a:r>
-              <a:rPr lang="ru-RU" dirty="0" smtClean="0"/>
-              <a:t>MMIO</a:t>
-            </a:r>
-          </a:p>
-          <a:p>
-            <a:endParaRPr lang="ru-RU" sz="2000" dirty="0">
+              <a:rPr lang="ru-RU" dirty="0">
+                <a:solidFill>
+                  <a:sysClr val="windowText" lastClr="000000"/>
+                </a:solidFill>
+              </a:rPr>
+              <a:t> режиме </a:t>
+            </a:r>
+            <a:r>
+              <a:rPr lang="ru-RU" dirty="0" err="1">
+                <a:solidFill>
+                  <a:sysClr val="windowText" lastClr="000000"/>
+                </a:solidFill>
+              </a:rPr>
+              <a:t>фаззить</a:t>
+            </a:r>
+            <a:r>
+              <a:rPr lang="ru-RU" dirty="0">
+                <a:solidFill>
+                  <a:sysClr val="windowText" lastClr="000000"/>
+                </a:solidFill>
+              </a:rPr>
+              <a:t> операционную систему целиком. Реализован через специальную инструкцию (</a:t>
+            </a:r>
+            <a:r>
+              <a:rPr lang="ru-RU" dirty="0" err="1">
+                <a:solidFill>
+                  <a:sysClr val="windowText" lastClr="000000"/>
+                </a:solidFill>
+              </a:rPr>
+              <a:t>aflCall</a:t>
+            </a:r>
+            <a:r>
+              <a:rPr lang="ru-RU" dirty="0">
+                <a:solidFill>
+                  <a:sysClr val="windowText" lastClr="000000"/>
+                </a:solidFill>
+              </a:rPr>
+              <a:t> (0f 24)), которая была добавлена в QEMU x64 </a:t>
+            </a:r>
+            <a:r>
+              <a:rPr lang="ru-RU" dirty="0" smtClean="0">
+                <a:solidFill>
+                  <a:sysClr val="windowText" lastClr="000000"/>
+                </a:solidFill>
+              </a:rPr>
+              <a:t>CPU</a:t>
+            </a:r>
+          </a:p>
+          <a:p>
+            <a:pPr marL="285750" indent="-285750">
+              <a:buFont typeface="Arial" panose="020B0604020202020204" pitchFamily="34" charset="0"/>
+              <a:buChar char="•"/>
+            </a:pPr>
+            <a:endParaRPr lang="ru-RU" dirty="0">
               <a:solidFill>
                 <a:sysClr val="windowText" lastClr="000000"/>
               </a:solidFill>
             </a:endParaRPr>
           </a:p>
           <a:p>
-            <a:r>
-              <a:rPr lang="ru-RU" dirty="0"/>
-              <a:t>AFL/QEMU </a:t>
-            </a:r>
-            <a:r>
-              <a:rPr lang="ru-RU" dirty="0" err="1"/>
-              <a:t>фаззинг</a:t>
-            </a:r>
-            <a:r>
-              <a:rPr lang="ru-RU" dirty="0"/>
-              <a:t> с полной эмуляцией </a:t>
+            <a:pPr marL="285750" indent="-285750">
+              <a:buFont typeface="Arial" panose="020B0604020202020204" pitchFamily="34" charset="0"/>
+              <a:buChar char="•"/>
+            </a:pPr>
+            <a:r>
+              <a:rPr lang="ru-RU" dirty="0" err="1">
+                <a:solidFill>
+                  <a:sysClr val="windowText" lastClr="000000"/>
+                </a:solidFill>
+              </a:rPr>
+              <a:t>Фаззинг</a:t>
             </a:r>
             <a:r>
               <a:rPr lang="ru-RU" dirty="0">
-                <a:hlinkClick r:id="rId2"/>
-              </a:rPr>
-              <a:t>системы</a:t>
-            </a:r>
-            <a:r>
-              <a:rPr lang="ru-RU" dirty="0"/>
-              <a:t>. </a:t>
-            </a:r>
-            <a:r>
-              <a:rPr lang="ru-RU" dirty="0" err="1"/>
-              <a:t>Форк</a:t>
-            </a:r>
-            <a:r>
-              <a:rPr lang="ru-RU" dirty="0"/>
-              <a:t> от </a:t>
-            </a:r>
-            <a:r>
-              <a:rPr lang="ru-RU" dirty="0" err="1"/>
-              <a:t>nccgroup</a:t>
-            </a:r>
-            <a:r>
-              <a:rPr lang="ru-RU" dirty="0"/>
-              <a:t>. Позволяет в </a:t>
-            </a:r>
-            <a:r>
-              <a:rPr lang="ru-RU" dirty="0" err="1"/>
-              <a:t>qemu</a:t>
-            </a:r>
-            <a:r>
-              <a:rPr lang="ru-RU" dirty="0"/>
-              <a:t> режиме </a:t>
-            </a:r>
-            <a:r>
-              <a:rPr lang="ru-RU" dirty="0" err="1"/>
-              <a:t>фаззить</a:t>
-            </a:r>
-            <a:r>
-              <a:rPr lang="ru-RU" dirty="0"/>
-              <a:t> операционную систему целиком. Реализован через специальную инструкцию (</a:t>
-            </a:r>
-            <a:r>
-              <a:rPr lang="ru-RU" dirty="0" err="1"/>
-              <a:t>aflCall</a:t>
-            </a:r>
-            <a:r>
-              <a:rPr lang="ru-RU" dirty="0"/>
-              <a:t> (0f 24)), которая была добавлена в QEMU x64 CPU. К сожалению, уже не поддерживается, последняя версия </a:t>
-            </a:r>
-            <a:r>
-              <a:rPr lang="ru-RU" dirty="0" err="1"/>
-              <a:t>afl</a:t>
-            </a:r>
-            <a:r>
-              <a:rPr lang="ru-RU" dirty="0"/>
-              <a:t> в нем 2.06b.</a:t>
-            </a:r>
-            <a:endParaRPr lang="ru-RU" sz="2000" dirty="0">
+                <a:solidFill>
+                  <a:sysClr val="windowText" lastClr="000000"/>
+                </a:solidFill>
+              </a:rPr>
+              <a:t> выполняется в </a:t>
+            </a:r>
+            <a:r>
+              <a:rPr lang="ru-RU" dirty="0" smtClean="0">
+                <a:solidFill>
+                  <a:sysClr val="windowText" lastClr="000000"/>
+                </a:solidFill>
+              </a:rPr>
+              <a:t>RAM-памяти, что позволяет значительно увеличить производительность </a:t>
+            </a:r>
+            <a:r>
+              <a:rPr lang="ru-RU" dirty="0" err="1" smtClean="0">
+                <a:solidFill>
+                  <a:sysClr val="windowText" lastClr="000000"/>
+                </a:solidFill>
+              </a:rPr>
+              <a:t>фаззинга</a:t>
+            </a:r>
+            <a:endParaRPr lang="ru-RU" dirty="0" smtClean="0">
               <a:solidFill>
                 <a:sysClr val="windowText" lastClr="000000"/>
               </a:solidFill>
             </a:endParaRPr>
           </a:p>
+          <a:p>
+            <a:pPr marL="285750" indent="-285750">
+              <a:buFont typeface="Arial" panose="020B0604020202020204" pitchFamily="34" charset="0"/>
+              <a:buChar char="•"/>
+            </a:pPr>
+            <a:endParaRPr lang="ru-RU" dirty="0">
+              <a:solidFill>
+                <a:sysClr val="windowText" lastClr="000000"/>
+              </a:solidFill>
+            </a:endParaRPr>
+          </a:p>
+          <a:p>
+            <a:pPr marL="285750" indent="-285750">
+              <a:buFont typeface="Arial" panose="020B0604020202020204" pitchFamily="34" charset="0"/>
+              <a:buChar char="•"/>
+            </a:pPr>
+            <a:r>
+              <a:rPr lang="ru-RU" dirty="0" smtClean="0">
+                <a:solidFill>
+                  <a:sysClr val="windowText" lastClr="000000"/>
+                </a:solidFill>
+              </a:rPr>
+              <a:t>Имеет инструмент </a:t>
+            </a:r>
+            <a:r>
+              <a:rPr lang="en-US" dirty="0" err="1" smtClean="0">
+                <a:solidFill>
+                  <a:sysClr val="windowText" lastClr="000000"/>
+                </a:solidFill>
+              </a:rPr>
+              <a:t>TriforceLinuxSyscallFuzzer</a:t>
+            </a:r>
+            <a:r>
+              <a:rPr lang="ru-RU" dirty="0" smtClean="0">
+                <a:solidFill>
+                  <a:sysClr val="windowText" lastClr="000000"/>
+                </a:solidFill>
+              </a:rPr>
+              <a:t>, предназначенный для </a:t>
+            </a:r>
+            <a:r>
+              <a:rPr lang="ru-RU" dirty="0" err="1" smtClean="0">
+                <a:solidFill>
+                  <a:sysClr val="windowText" lastClr="000000"/>
+                </a:solidFill>
+              </a:rPr>
+              <a:t>фаззинга</a:t>
+            </a:r>
+            <a:r>
+              <a:rPr lang="ru-RU" dirty="0" smtClean="0">
+                <a:solidFill>
+                  <a:sysClr val="windowText" lastClr="000000"/>
+                </a:solidFill>
+              </a:rPr>
+              <a:t> системных вызовов ядра </a:t>
+            </a:r>
+            <a:r>
+              <a:rPr lang="en-US" dirty="0" smtClean="0">
+                <a:solidFill>
+                  <a:sysClr val="windowText" lastClr="000000"/>
+                </a:solidFill>
+              </a:rPr>
+              <a:t>Linux, </a:t>
+            </a:r>
+            <a:r>
+              <a:rPr lang="kk-KZ" dirty="0" smtClean="0">
+                <a:solidFill>
+                  <a:sysClr val="windowText" lastClr="000000"/>
+                </a:solidFill>
+              </a:rPr>
+              <a:t>который может быть портирован под </a:t>
+            </a:r>
+            <a:r>
+              <a:rPr lang="en-US" dirty="0" smtClean="0">
+                <a:solidFill>
+                  <a:sysClr val="windowText" lastClr="000000"/>
+                </a:solidFill>
+              </a:rPr>
+              <a:t>QNX</a:t>
+            </a:r>
+            <a:endParaRPr lang="ru-RU" dirty="0" smtClean="0">
+              <a:solidFill>
+                <a:sysClr val="windowText" lastClr="000000"/>
+              </a:solidFill>
+            </a:endParaRPr>
+          </a:p>
+          <a:p>
+            <a:pPr marL="285750" indent="-285750">
+              <a:buFont typeface="Arial" panose="020B0604020202020204" pitchFamily="34" charset="0"/>
+              <a:buChar char="•"/>
+            </a:pPr>
+            <a:endParaRPr lang="ru-RU" dirty="0">
+              <a:solidFill>
+                <a:sysClr val="windowText" lastClr="000000"/>
+              </a:solidFill>
+            </a:endParaRPr>
+          </a:p>
+          <a:p>
+            <a:pPr marL="285750" indent="-285750">
+              <a:buFont typeface="Arial" panose="020B0604020202020204" pitchFamily="34" charset="0"/>
+              <a:buChar char="•"/>
+            </a:pPr>
+            <a:r>
+              <a:rPr lang="ru-RU" dirty="0" smtClean="0">
+                <a:solidFill>
+                  <a:sysClr val="windowText" lastClr="000000"/>
+                </a:solidFill>
+              </a:rPr>
+              <a:t>Позволяет получать отчеты о падении или зависании системы</a:t>
+            </a:r>
+          </a:p>
+          <a:p>
+            <a:pPr marL="285750" indent="-285750">
+              <a:buFont typeface="Arial" panose="020B0604020202020204" pitchFamily="34" charset="0"/>
+              <a:buChar char="•"/>
+            </a:pPr>
+            <a:endParaRPr lang="ru-RU" dirty="0">
+              <a:solidFill>
+                <a:sysClr val="windowText" lastClr="000000"/>
+              </a:solidFill>
+            </a:endParaRPr>
+          </a:p>
+          <a:p>
+            <a:pPr marL="285750" indent="-285750">
+              <a:buFont typeface="Arial" panose="020B0604020202020204" pitchFamily="34" charset="0"/>
+              <a:buChar char="•"/>
+            </a:pPr>
+            <a:endParaRPr lang="ru-RU" dirty="0">
+              <a:solidFill>
+                <a:sysClr val="windowText" lastClr="000000"/>
+              </a:solidFill>
+            </a:endParaRPr>
+          </a:p>
         </p:txBody>
       </p:sp>
     </p:spTree>
     <p:extLst>
       <p:ext uri="{BB962C8B-B14F-4D97-AF65-F5344CB8AC3E}">
-        <p14:creationId xmlns:p14="http://schemas.microsoft.com/office/powerpoint/2010/main" val="352092235"/>
+        <p14:creationId xmlns:p14="http://schemas.microsoft.com/office/powerpoint/2010/main" val="1693940509"/>
       </p:ext>
     </p:extLst>
   </p:cSld>
@@ -18084,8 +18877,12 @@
           <a:lstStyle/>
           <a:p>
             <a:r>
-              <a:rPr lang="ru-RU" dirty="0" smtClean="0"/>
-              <a:t>НЕДОСТАТКИ</a:t>
+              <a:rPr lang="en-US" dirty="0" err="1" smtClean="0"/>
+              <a:t>TriforceAFL</a:t>
+            </a:r>
+            <a:r>
+              <a:rPr lang="en-US" dirty="0" smtClean="0"/>
+              <a:t> – DRIVER (AGENT)</a:t>
             </a:r>
             <a:endParaRPr lang="ru-RU" dirty="0"/>
           </a:p>
@@ -18113,20 +18910,20 @@
           <a:lstStyle/>
           <a:p>
             <a:r>
-              <a:rPr lang="kk-KZ" dirty="0">
-                <a:solidFill>
-                  <a:sysClr val="windowText" lastClr="000000"/>
-                </a:solidFill>
-              </a:rPr>
-              <a:t>Фаззинг виртуальной </a:t>
-            </a:r>
-            <a:r>
               <a:rPr lang="kk-KZ" dirty="0" smtClean="0">
                 <a:solidFill>
                   <a:sysClr val="windowText" lastClr="000000"/>
                 </a:solidFill>
               </a:rPr>
-              <a:t>машины</a:t>
+              <a:t>Фаззинг виртуальной машины</a:t>
+            </a:r>
+            <a:r>
+              <a:rPr lang="ru-RU" dirty="0" smtClean="0">
+                <a:solidFill>
+                  <a:sysClr val="windowText" lastClr="000000"/>
+                </a:solidFill>
+              </a:rPr>
+              <a:t>. Типы</a:t>
             </a:r>
             <a:endParaRPr lang="ru-RU" dirty="0">
               <a:solidFill>
@@ -18136,16 +18933,40 @@
           </a:p>
         </p:txBody>
       </p:sp>
-      <p:sp>
-        <p:nvSpPr>
-          <p:cNvPr id="5" name="TextBox 4"/>
+      <p:pic>
+        <p:nvPicPr>
+          <p:cNvPr id="3" name="Рисунок 2"/>
+          <p:cNvPicPr>
+            <a:picLocks noChangeAspect="1"/>
+          </p:cNvPicPr>
+          <p:nvPr/>
+        </p:nvPicPr>
+        <p:blipFill>
+          <a:blip r:embed="rId2"/>
+          <a:stretch>
+            <a:fillRect/>
+          </a:stretch>
+        </p:blipFill>
+        <p:spPr>
+          <a:xfrm>
+            <a:off x="1959283" y="1402243"/>
+            <a:ext cx="6941520" cy="3178206"/>
+          </a:xfrm>
+          <a:prstGeom prst="rect">
+            <a:avLst/>
+          </a:prstGeom>
+        </p:spPr>
+      </p:pic>
+      <p:sp>
+        <p:nvSpPr>
+          <p:cNvPr id="6" name="TextBox 5"/>
           <p:cNvSpPr txBox="1"/>
           <p:nvPr/>
         </p:nvSpPr>
         <p:spPr>
           <a:xfrm>
-            <a:off x="442912" y="1382939"/>
-            <a:ext cx="8578413" cy="4401205"/>
+            <a:off x="3224798" y="4782982"/>
+            <a:ext cx="4410490" cy="369332"/>
           </a:xfrm>
           <a:prstGeom prst="rect">
             <a:avLst/>
@@ -18158,191 +18979,203 @@
           </a:bodyPr>
           <a:lstStyle/>
           <a:p>
-            <a:pPr marL="285750" indent="-285750">
-              <a:buFont typeface="Arial" panose="020B0604020202020204" pitchFamily="34" charset="0"/>
-              <a:buChar char="•"/>
-            </a:pPr>
-            <a:r>
-              <a:rPr lang="ru-RU" sz="2000" dirty="0" smtClean="0">
-                <a:solidFill>
-                  <a:sysClr val="windowText" lastClr="000000"/>
-                </a:solidFill>
-              </a:rPr>
-              <a:t>Отсутствие </a:t>
-            </a:r>
-            <a:r>
-              <a:rPr lang="ru-RU" sz="2000" dirty="0" err="1" smtClean="0">
-                <a:solidFill>
-                  <a:sysClr val="windowText" lastClr="000000"/>
-                </a:solidFill>
-              </a:rPr>
-              <a:t>инструментации</a:t>
-            </a:r>
-            <a:r>
-              <a:rPr lang="ru-RU" sz="2000" dirty="0" smtClean="0">
-                <a:solidFill>
-                  <a:sysClr val="windowText" lastClr="000000"/>
-                </a:solidFill>
-              </a:rPr>
-              <a:t> не позволяет отследить ошибочные обращения к памяти</a:t>
-            </a:r>
-          </a:p>
-          <a:p>
-            <a:pPr marL="285750" indent="-285750">
-              <a:buFont typeface="Arial" panose="020B0604020202020204" pitchFamily="34" charset="0"/>
-              <a:buChar char="•"/>
-            </a:pPr>
-            <a:endParaRPr lang="ru-RU" sz="2000" dirty="0" smtClean="0">
+            <a:pPr algn="ctr"/>
+            <a:r>
+              <a:rPr lang="kk-KZ" dirty="0" smtClean="0">
+                <a:solidFill>
+                  <a:sysClr val="windowText" lastClr="000000"/>
+                </a:solidFill>
+              </a:rPr>
+              <a:t>Рис</a:t>
+            </a:r>
+            <a:r>
+              <a:rPr lang="ru-RU" dirty="0" smtClean="0">
+                <a:solidFill>
+                  <a:sysClr val="windowText" lastClr="000000"/>
+                </a:solidFill>
+              </a:rPr>
+              <a:t>1. Архитектура </a:t>
+            </a:r>
+            <a:r>
+              <a:rPr lang="en-US" dirty="0" err="1" smtClean="0">
+                <a:solidFill>
+                  <a:sysClr val="windowText" lastClr="000000"/>
+                </a:solidFill>
+              </a:rPr>
+              <a:t>TriforceAFL</a:t>
+            </a:r>
+            <a:endParaRPr lang="ru-RU" dirty="0">
               <a:solidFill>
                 <a:sysClr val="windowText" lastClr="000000"/>
               </a:solidFill>
             </a:endParaRPr>
           </a:p>
-          <a:p>
-            <a:pPr marL="285750" indent="-285750">
-              <a:buFont typeface="Arial" panose="020B0604020202020204" pitchFamily="34" charset="0"/>
-              <a:buChar char="•"/>
-            </a:pPr>
-            <a:r>
-              <a:rPr lang="ru-RU" sz="2000" dirty="0" smtClean="0">
-                <a:solidFill>
-                  <a:sysClr val="windowText" lastClr="000000"/>
-                </a:solidFill>
-              </a:rPr>
-              <a:t>Для воспроизведения ошибки может потребоваться повторить в точности всю историю </a:t>
-            </a:r>
-            <a:r>
-              <a:rPr lang="ru-RU" sz="2000" dirty="0" err="1" smtClean="0">
-                <a:solidFill>
-                  <a:sysClr val="windowText" lastClr="000000"/>
-                </a:solidFill>
-              </a:rPr>
-              <a:t>фаззинга</a:t>
-            </a:r>
-            <a:endParaRPr lang="ru-RU" sz="2000" dirty="0" smtClean="0">
+        </p:txBody>
+      </p:sp>
+      <p:sp>
+        <p:nvSpPr>
+          <p:cNvPr id="7" name="Овал 6"/>
+          <p:cNvSpPr/>
+          <p:nvPr/>
+        </p:nvSpPr>
+        <p:spPr>
+          <a:xfrm>
+            <a:off x="3224799" y="1808820"/>
+            <a:ext cx="1431042" cy="450050"/>
+          </a:xfrm>
+          <a:prstGeom prst="ellipse">
+            <a:avLst/>
+          </a:prstGeom>
+          <a:noFill/>
+          <a:ln w="57150">
+            <a:solidFill>
+              <a:schemeClr val="accent2">
+                <a:lumMod val="40000"/>
+                <a:lumOff val="60000"/>
+              </a:schemeClr>
+            </a:solidFill>
+          </a:ln>
+        </p:spPr>
+        <p:style>
+          <a:lnRef idx="2">
+            <a:schemeClr val="accent1">
+              <a:shade val="50000"/>
+            </a:schemeClr>
+          </a:lnRef>
+          <a:fillRef idx="1">
+            <a:schemeClr val="accent1"/>
+          </a:fillRef>
+          <a:effectRef idx="0">
+            <a:schemeClr val="accent1"/>
+          </a:effectRef>
+          <a:fontRef idx="minor">
+            <a:schemeClr val="lt1"/>
+          </a:fontRef>
+        </p:style>
+        <p:txBody>
+          <a:bodyPr rtlCol="0" anchor="ctr"/>
+          <a:lstStyle/>
+          <a:p>
+            <a:pPr algn="ctr"/>
+            <a:endParaRPr lang="ru-RU"/>
+          </a:p>
+        </p:txBody>
+      </p:sp>
+      <p:sp>
+        <p:nvSpPr>
+          <p:cNvPr id="8" name="TextBox 7"/>
+          <p:cNvSpPr txBox="1"/>
+          <p:nvPr/>
+        </p:nvSpPr>
+        <p:spPr>
+          <a:xfrm>
+            <a:off x="862035" y="6264315"/>
+            <a:ext cx="9136015" cy="523220"/>
+          </a:xfrm>
+          <a:prstGeom prst="rect">
+            <a:avLst/>
+          </a:prstGeom>
+          <a:noFill/>
+        </p:spPr>
+        <p:txBody>
+          <a:bodyPr wrap="square" rtlCol="0">
+            <a:spAutoFit/>
+          </a:bodyPr>
+          <a:lstStyle/>
+          <a:p>
+            <a:pPr algn="just"/>
+            <a:r>
+              <a:rPr lang="en-US" sz="1400" dirty="0">
+                <a:solidFill>
+                  <a:sysClr val="windowText" lastClr="000000"/>
+                </a:solidFill>
+              </a:rPr>
+              <a:t>P. Pandey, A. Sarkar and A. Banerjee, "</a:t>
+            </a:r>
+            <a:r>
+              <a:rPr lang="en-US" sz="1400" dirty="0" err="1">
+                <a:solidFill>
+                  <a:sysClr val="windowText" lastClr="000000"/>
+                </a:solidFill>
+              </a:rPr>
+              <a:t>Triforce</a:t>
+            </a:r>
+            <a:r>
+              <a:rPr lang="en-US" sz="1400" dirty="0">
+                <a:solidFill>
+                  <a:sysClr val="windowText" lastClr="000000"/>
+                </a:solidFill>
+              </a:rPr>
+              <a:t> QNX </a:t>
+            </a:r>
+            <a:r>
+              <a:rPr lang="en-US" sz="1400" dirty="0" err="1">
+                <a:solidFill>
+                  <a:sysClr val="windowText" lastClr="000000"/>
+                </a:solidFill>
+              </a:rPr>
+              <a:t>Syscall</a:t>
+            </a:r>
+            <a:r>
+              <a:rPr lang="en-US" sz="1400" dirty="0">
+                <a:solidFill>
+                  <a:sysClr val="windowText" lastClr="000000"/>
+                </a:solidFill>
+              </a:rPr>
+              <a:t> </a:t>
+            </a:r>
+            <a:r>
+              <a:rPr lang="en-US" sz="1400" dirty="0" err="1">
+                <a:solidFill>
+                  <a:sysClr val="windowText" lastClr="000000"/>
+                </a:solidFill>
+              </a:rPr>
+              <a:t>Fuzzer</a:t>
+            </a:r>
+            <a:r>
+              <a:rPr lang="en-US" sz="1400" dirty="0">
+                <a:solidFill>
+                  <a:sysClr val="windowText" lastClr="000000"/>
+                </a:solidFill>
+              </a:rPr>
+              <a:t>," 2019 IEEE International Symposium on Software Reliability Engineering Workshops (ISSREW), Berlin, Germany, 2019, pp. 59-60, </a:t>
+            </a:r>
+            <a:r>
+              <a:rPr lang="en-US" sz="1400" dirty="0" err="1">
+                <a:solidFill>
+                  <a:sysClr val="windowText" lastClr="000000"/>
+                </a:solidFill>
+              </a:rPr>
+              <a:t>doi</a:t>
+            </a:r>
+            <a:r>
+              <a:rPr lang="en-US" sz="1400" dirty="0">
+                <a:solidFill>
+                  <a:sysClr val="windowText" lastClr="000000"/>
+                </a:solidFill>
+              </a:rPr>
+              <a:t>: </a:t>
+            </a:r>
+            <a:r>
+              <a:rPr lang="en-US" sz="1400" dirty="0" smtClean="0">
+                <a:solidFill>
+                  <a:sysClr val="windowText" lastClr="000000"/>
+                </a:solidFill>
+              </a:rPr>
+              <a:t>10.1109/ISSREW.2019.00043</a:t>
+            </a:r>
+            <a:endParaRPr lang="ru-RU" dirty="0">
               <a:solidFill>
                 <a:sysClr val="windowText" lastClr="000000"/>
               </a:solidFill>
             </a:endParaRPr>
           </a:p>
-          <a:p>
-            <a:pPr marL="285750" indent="-285750">
-              <a:buFont typeface="Arial" panose="020B0604020202020204" pitchFamily="34" charset="0"/>
-              <a:buChar char="•"/>
-            </a:pPr>
-            <a:endParaRPr lang="ru-RU" sz="2000" dirty="0" smtClean="0">
-              <a:solidFill>
-                <a:sysClr val="windowText" lastClr="000000"/>
-              </a:solidFill>
-            </a:endParaRPr>
-          </a:p>
-          <a:p>
-            <a:pPr marL="285750" indent="-285750">
-              <a:buFont typeface="Arial" panose="020B0604020202020204" pitchFamily="34" charset="0"/>
-              <a:buChar char="•"/>
-            </a:pPr>
-            <a:r>
-              <a:rPr lang="ru-RU" sz="2000" dirty="0" smtClean="0">
-                <a:solidFill>
-                  <a:sysClr val="windowText" lastClr="000000"/>
-                </a:solidFill>
-              </a:rPr>
-              <a:t>Нивелирует этот недостаток </a:t>
-            </a:r>
-            <a:r>
-              <a:rPr lang="en-US" sz="2000" dirty="0" smtClean="0">
-                <a:solidFill>
-                  <a:sysClr val="windowText" lastClr="000000"/>
-                </a:solidFill>
-              </a:rPr>
-              <a:t>snapshot-based </a:t>
-            </a:r>
-            <a:r>
-              <a:rPr lang="kk-KZ" sz="2000" dirty="0" smtClean="0">
-                <a:solidFill>
-                  <a:sysClr val="windowText" lastClr="000000"/>
-                </a:solidFill>
-              </a:rPr>
-              <a:t>подход</a:t>
-            </a:r>
-            <a:r>
-              <a:rPr lang="ru-RU" sz="2000" dirty="0" smtClean="0">
-                <a:solidFill>
-                  <a:sysClr val="windowText" lastClr="000000"/>
-                </a:solidFill>
-              </a:rPr>
-              <a:t>, который позволяет каждый прогон запускать на дампе виртуальной машины</a:t>
-            </a:r>
-          </a:p>
-          <a:p>
-            <a:pPr marL="285750" indent="-285750">
-              <a:buFont typeface="Arial" panose="020B0604020202020204" pitchFamily="34" charset="0"/>
-              <a:buChar char="•"/>
-            </a:pPr>
-            <a:endParaRPr lang="ru-RU" sz="2000" dirty="0" smtClean="0">
-              <a:solidFill>
-                <a:sysClr val="windowText" lastClr="000000"/>
-              </a:solidFill>
-            </a:endParaRPr>
-          </a:p>
-          <a:p>
-            <a:pPr marL="285750" indent="-285750">
-              <a:buFont typeface="Arial" panose="020B0604020202020204" pitchFamily="34" charset="0"/>
-              <a:buChar char="•"/>
-            </a:pPr>
-            <a:r>
-              <a:rPr lang="ru-RU" sz="2000" dirty="0" smtClean="0">
-                <a:solidFill>
-                  <a:sysClr val="windowText" lastClr="000000"/>
-                </a:solidFill>
-              </a:rPr>
-              <a:t>Все еще невозможно отследить ошибки памяти</a:t>
-            </a:r>
-          </a:p>
-          <a:p>
-            <a:pPr marL="285750" indent="-285750">
-              <a:buFont typeface="Arial" panose="020B0604020202020204" pitchFamily="34" charset="0"/>
-              <a:buChar char="•"/>
-            </a:pPr>
-            <a:endParaRPr lang="ru-RU" sz="2000" dirty="0" smtClean="0">
-              <a:solidFill>
-                <a:sysClr val="windowText" lastClr="000000"/>
-              </a:solidFill>
-            </a:endParaRPr>
-          </a:p>
-          <a:p>
-            <a:pPr marL="285750" indent="-285750">
-              <a:buFont typeface="Arial" panose="020B0604020202020204" pitchFamily="34" charset="0"/>
-              <a:buChar char="•"/>
-            </a:pPr>
-            <a:r>
-              <a:rPr lang="ru-RU" sz="2000" dirty="0" smtClean="0">
-                <a:solidFill>
-                  <a:sysClr val="windowText" lastClr="000000"/>
-                </a:solidFill>
-              </a:rPr>
-              <a:t>Требуется написание агента, который будет запускаться внутри виртуальной машины и являться ключевым звеном, определяющим эффективность </a:t>
-            </a:r>
-            <a:r>
-              <a:rPr lang="ru-RU" sz="2000" dirty="0" err="1" smtClean="0">
-                <a:solidFill>
-                  <a:sysClr val="windowText" lastClr="000000"/>
-                </a:solidFill>
-              </a:rPr>
-              <a:t>фаззинга</a:t>
-            </a:r>
-            <a:endParaRPr lang="ru-RU" sz="2000" dirty="0">
-              <a:solidFill>
-                <a:sysClr val="windowText" lastClr="000000"/>
-              </a:solidFill>
-            </a:endParaRPr>
-          </a:p>
         </p:txBody>
       </p:sp>
     </p:spTree>
     <p:extLst>
       <p:ext uri="{BB962C8B-B14F-4D97-AF65-F5344CB8AC3E}">
-        <p14:creationId xmlns:p14="http://schemas.microsoft.com/office/powerpoint/2010/main" val="3304444939"/>
+        <p14:creationId xmlns:p14="http://schemas.microsoft.com/office/powerpoint/2010/main" val="352092235"/>
       </p:ext>
     </p:extLst>
   </p:cSld>
@@ -18376,47 +19209,6 @@
           <a:chExt cx="0" cy="0"/>
         </a:xfrm>
       </p:grpSpPr>
-      <p:pic>
-        <p:nvPicPr>
-          <p:cNvPr id="3074" name="Picture 2" descr="Выпуск новых процессоров Intel Broadwell задерживается - 4PDA"/>
-          <p:cNvPicPr>
-            <a:picLocks noChangeAspect="1" noChangeArrowheads="1"/>
-          </p:cNvPicPr>
-          <p:nvPr/>
-        </p:nvPicPr>
-        <p:blipFill>
-          <a:blip r:embed="rId2">
-            <a:extLst>
-              <a:ext uri="{28A0092B-C50C-407E-A947-70E740481C1C}">
-                <a14:useLocalDpi xmlns:a14="http://schemas.microsoft.com/office/drawing/2010/main" val="0"/>
-              </a:ext>
-            </a:extLst>
-          </a:blip>
-          <a:srcRect/>
-          <a:stretch>
-            <a:fillRect/>
-          </a:stretch>
-        </p:blipFill>
-        <p:spPr bwMode="auto">
-          <a:xfrm>
-            <a:off x="7851195" y="3406497"/>
-            <a:ext cx="4260050" cy="3195038"/>
-          </a:xfrm>
-          <a:prstGeom prst="rect">
-            <a:avLst/>
-          </a:prstGeom>
-          <a:noFill/>
-          <a:extLst>
-            <a:ext uri="{909E8E84-426E-40DD-AFC4-6F175D3DCCD1}">
-              <a14:hiddenFill xmlns:a14="http://schemas.microsoft.com/office/drawing/2010/main">
-                <a:solidFill>
-                  <a:srgbClr val="FFFFFF"/>
-                </a:solidFill>
-              </a14:hiddenFill>
-            </a:ext>
-          </a:extLst>
-        </p:spPr>
-      </p:pic>
       <p:sp>
         <p:nvSpPr>
           <p:cNvPr id="2" name="Текст 1">
@@ -18433,14 +19225,27 @@
             <p:ph type="body" sz="half" idx="11"/>
           </p:nvPr>
         </p:nvSpPr>
-        <p:spPr/>
+        <p:spPr>
+          <a:xfrm>
+            <a:off x="442912" y="818710"/>
+            <a:ext cx="9974262" cy="381000"/>
+          </a:xfrm>
+        </p:spPr>
         <p:txBody>
           <a:bodyPr/>
           <a:lstStyle/>
           <a:p>
             <a:r>
+              <a:rPr lang="en-US" dirty="0" err="1" smtClean="0"/>
+              <a:t>TriforceAFL</a:t>
+            </a:r>
+            <a:r>
               <a:rPr lang="en-US" dirty="0" smtClean="0"/>
-              <a:t>Intel Processor Tracing</a:t>
+              <a:t> </a:t>
+            </a:r>
+            <a:r>
+              <a:rPr lang="ru-RU" dirty="0" smtClean="0"/>
+              <a:t>- недостатки</a:t>
             </a:r>
             <a:endParaRPr lang="ru-RU" dirty="0"/>
           </a:p>
@@ -18468,27 +19273,39 @@
           <a:lstStyle/>
           <a:p>
             <a:r>
-              <a:rPr lang="kk-KZ" dirty="0"/>
+              <a:rPr lang="kk-KZ" dirty="0" smtClean="0">
+                <a:solidFill>
+                  <a:sysClr val="windowText" lastClr="000000"/>
+                </a:solidFill>
+              </a:rPr>
               <a:t>Фаззинг виртуальной машины</a:t>
             </a:r>
             <a:r>
-              <a:rPr lang="ru-RU" dirty="0"/>
-              <a:t>. Покрытие</a:t>
-            </a:r>
-            <a:endParaRPr lang="ru-RU" dirty="0"/>
-          </a:p>
-        </p:txBody>
-      </p:sp>
-      <p:sp>
-        <p:nvSpPr>
-          <p:cNvPr id="3" name="TextBox 2"/>
+              <a:rPr lang="ru-RU" dirty="0" smtClean="0">
+                <a:solidFill>
+                  <a:sysClr val="windowText" lastClr="000000"/>
+                </a:solidFill>
+              </a:rPr>
+              <a:t>. Типы</a:t>
+            </a:r>
+            <a:endParaRPr lang="ru-RU" dirty="0">
+              <a:solidFill>
+                <a:sysClr val="windowText" lastClr="000000"/>
+              </a:solidFill>
+            </a:endParaRPr>
+          </a:p>
+        </p:txBody>
+      </p:sp>
+      <p:sp>
+        <p:nvSpPr>
+          <p:cNvPr id="5" name="TextBox 4"/>
           <p:cNvSpPr txBox="1"/>
           <p:nvPr/>
         </p:nvSpPr>
         <p:spPr>
           <a:xfrm>
-            <a:off x="442912" y="1385084"/>
-            <a:ext cx="7740860" cy="3693319"/>
+            <a:off x="442912" y="1403775"/>
+            <a:ext cx="11323718" cy="3200876"/>
           </a:xfrm>
           <a:prstGeom prst="rect">
             <a:avLst/>
@@ -18506,49 +19323,53 @@
               <a:buChar char="•"/>
             </a:pPr>
             <a:r>
-              <a:rPr lang="ru-RU" dirty="0" err="1"/>
-              <a:t>Intel</a:t>
-            </a:r>
-            <a:r>
-              <a:rPr lang="ru-RU" dirty="0"/>
-              <a:t> </a:t>
-            </a:r>
-            <a:r>
-              <a:rPr lang="ru-RU" dirty="0" smtClean="0"/>
-              <a:t>PT </a:t>
-            </a:r>
-            <a:r>
-              <a:rPr lang="ru-RU" dirty="0"/>
-              <a:t>— это функция современных процессоров </a:t>
-            </a:r>
-            <a:r>
-              <a:rPr lang="ru-RU" dirty="0" err="1" smtClean="0"/>
-              <a:t>Intel</a:t>
-            </a:r>
-            <a:r>
-              <a:rPr lang="ru-RU" dirty="0" smtClean="0"/>
-              <a:t> начиная с 5 поколения </a:t>
-            </a:r>
-            <a:r>
-              <a:rPr lang="en-US" dirty="0" err="1" smtClean="0"/>
-              <a:t>Broadwell</a:t>
-            </a:r>
-            <a:r>
-              <a:rPr lang="en-US" dirty="0" smtClean="0"/>
-              <a:t> (2015 </a:t>
-            </a:r>
-            <a:r>
-              <a:rPr lang="ru-RU" dirty="0" smtClean="0"/>
-              <a:t>год)</a:t>
-            </a:r>
-            <a:endParaRPr lang="en-US" dirty="0" smtClean="0"/>
+              <a:rPr lang="ru-RU" dirty="0" smtClean="0">
+                <a:solidFill>
+                  <a:sysClr val="windowText" lastClr="000000"/>
+                </a:solidFill>
+              </a:rPr>
+              <a:t>Предназначен в первую очередь для </a:t>
+            </a:r>
+            <a:r>
+              <a:rPr lang="ru-RU" dirty="0" err="1" smtClean="0">
+                <a:solidFill>
+                  <a:sysClr val="windowText" lastClr="000000"/>
+                </a:solidFill>
+              </a:rPr>
+              <a:t>фаззинга</a:t>
+            </a:r>
+            <a:r>
+              <a:rPr lang="ru-RU" dirty="0" smtClean="0">
+                <a:solidFill>
+                  <a:sysClr val="windowText" lastClr="000000"/>
+                </a:solidFill>
+              </a:rPr>
+              <a:t> системных вызовов ядра </a:t>
+            </a:r>
+            <a:r>
+              <a:rPr lang="en-US" dirty="0" smtClean="0">
+                <a:solidFill>
+                  <a:sysClr val="windowText" lastClr="000000"/>
+                </a:solidFill>
+              </a:rPr>
+              <a:t>Linux</a:t>
+            </a:r>
+            <a:endParaRPr lang="ru-RU" dirty="0" smtClean="0">
+              <a:solidFill>
+                <a:sysClr val="windowText" lastClr="000000"/>
+              </a:solidFill>
+            </a:endParaRPr>
           </a:p>
           <a:p>
             <a:pPr marL="285750" indent="-285750">
               <a:buFont typeface="Arial" panose="020B0604020202020204" pitchFamily="34" charset="0"/>
               <a:buChar char="•"/>
             </a:pPr>
-            <a:endParaRPr lang="en-US" dirty="0"/>
+            <a:endParaRPr lang="ru-RU" dirty="0">
+              <a:solidFill>
+                <a:sysClr val="windowText" lastClr="000000"/>
+              </a:solidFill>
+            </a:endParaRPr>
           </a:p>
           <a:p>
             <a:pPr marL="285750" indent="-285750">
@@ -18556,64 +19377,222 @@
               <a:buChar char="•"/>
             </a:pPr>
             <a:r>
-              <a:rPr lang="ru-RU" dirty="0" err="1"/>
-              <a:t>Intel</a:t>
-            </a:r>
-            <a:r>
-              <a:rPr lang="ru-RU" dirty="0"/>
-              <a:t> PT позволяет получить полный поток исполнения </a:t>
-            </a:r>
-            <a:r>
-              <a:rPr lang="ru-RU" dirty="0" smtClean="0"/>
-              <a:t>отлаживаемого </a:t>
-            </a:r>
-            <a:r>
-              <a:rPr lang="ru-RU" dirty="0"/>
-              <a:t>приложения с минимальным </a:t>
-            </a:r>
-            <a:r>
-              <a:rPr lang="ru-RU" dirty="0" err="1"/>
-              <a:t>оверхедом</a:t>
-            </a:r>
-            <a:r>
-              <a:rPr lang="ru-RU" dirty="0"/>
-              <a:t> (&lt;5%). При этом она поддерживает </a:t>
-            </a:r>
-            <a:r>
-              <a:rPr lang="ru-RU" dirty="0" err="1"/>
-              <a:t>многопоточность</a:t>
-            </a:r>
-            <a:r>
-              <a:rPr lang="ru-RU" dirty="0"/>
-              <a:t> и может помочь в установлении ошибок типа "состояние </a:t>
-            </a:r>
-            <a:r>
-              <a:rPr lang="ru-RU" dirty="0" smtClean="0"/>
-              <a:t>гонки</a:t>
-            </a:r>
-            <a:r>
-              <a:rPr lang="en-US" dirty="0" smtClean="0"/>
+              <a:rPr lang="ru-RU" dirty="0" smtClean="0">
+                <a:solidFill>
+                  <a:sysClr val="windowText" lastClr="000000"/>
+                </a:solidFill>
+              </a:rPr>
+              <a:t>Также</a:t>
+            </a:r>
+            <a:r>
+              <a:rPr lang="ru-RU" dirty="0">
+                <a:solidFill>
+                  <a:sysClr val="windowText" lastClr="000000"/>
+                </a:solidFill>
+              </a:rPr>
+              <a:t>, например, если файл собран </a:t>
+            </a:r>
+            <a:r>
+              <a:rPr lang="ru-RU" dirty="0" err="1">
+                <a:solidFill>
+                  <a:sysClr val="windowText" lastClr="000000"/>
+                </a:solidFill>
+              </a:rPr>
+              <a:t>toolchain</a:t>
+            </a:r>
+            <a:r>
+              <a:rPr lang="ru-RU" dirty="0">
+                <a:solidFill>
+                  <a:sysClr val="windowText" lastClr="000000"/>
+                </a:solidFill>
+              </a:rPr>
+              <a:t>, использующим аппаратные </a:t>
+            </a:r>
+            <a:r>
+              <a:rPr lang="ru-RU" dirty="0" err="1">
+                <a:solidFill>
+                  <a:sysClr val="windowText" lastClr="000000"/>
+                </a:solidFill>
+              </a:rPr>
+              <a:t>фичи</a:t>
+            </a:r>
+            <a:r>
+              <a:rPr lang="ru-RU" dirty="0">
+                <a:solidFill>
+                  <a:sysClr val="windowText" lastClr="000000"/>
+                </a:solidFill>
+              </a:rPr>
               <a:t> </a:t>
             </a:r>
             <a:r>
-              <a:rPr lang="ru-RU" dirty="0" smtClean="0"/>
-              <a:t>благодаря </a:t>
-            </a:r>
-            <a:r>
-              <a:rPr lang="ru-RU" dirty="0"/>
-              <a:t>отметкам времени при записи трассы </a:t>
-            </a:r>
-            <a:r>
-              <a:rPr lang="ru-RU" dirty="0" smtClean="0"/>
-              <a:t>приложения</a:t>
-            </a:r>
+              <a:rPr lang="ru-RU" dirty="0" err="1">
+                <a:solidFill>
+                  <a:sysClr val="windowText" lastClr="000000"/>
+                </a:solidFill>
+              </a:rPr>
+              <a:t>SoC</a:t>
+            </a:r>
+            <a:r>
+              <a:rPr lang="ru-RU" dirty="0">
+                <a:solidFill>
+                  <a:sysClr val="windowText" lastClr="000000"/>
+                </a:solidFill>
+              </a:rPr>
+              <a:t>, на котором запускается </a:t>
+            </a:r>
+            <a:r>
+              <a:rPr lang="ru-RU" dirty="0" err="1">
+                <a:solidFill>
+                  <a:sysClr val="windowText" lastClr="000000"/>
+                </a:solidFill>
+              </a:rPr>
+              <a:t>бинарь</a:t>
+            </a:r>
+            <a:r>
+              <a:rPr lang="ru-RU" dirty="0">
+                <a:solidFill>
+                  <a:sysClr val="windowText" lastClr="000000"/>
+                </a:solidFill>
+              </a:rPr>
+              <a:t> и который не поддерживается </a:t>
+            </a:r>
+            <a:r>
+              <a:rPr lang="ru-RU" dirty="0" err="1">
+                <a:solidFill>
+                  <a:sysClr val="windowText" lastClr="000000"/>
+                </a:solidFill>
+              </a:rPr>
+              <a:t>qemu</a:t>
+            </a:r>
+            <a:r>
+              <a:rPr lang="ru-RU" dirty="0">
+                <a:solidFill>
+                  <a:sysClr val="windowText" lastClr="000000"/>
+                </a:solidFill>
+              </a:rPr>
+              <a:t>, </a:t>
+            </a:r>
+            <a:r>
+              <a:rPr lang="ru-RU" dirty="0" err="1">
+                <a:solidFill>
+                  <a:sysClr val="windowText" lastClr="000000"/>
+                </a:solidFill>
+              </a:rPr>
+              <a:t>фаззинг</a:t>
+            </a:r>
+            <a:r>
+              <a:rPr lang="ru-RU" dirty="0">
+                <a:solidFill>
+                  <a:sysClr val="windowText" lastClr="000000"/>
+                </a:solidFill>
+              </a:rPr>
+              <a:t> оборвется, как только встретится специфическая инструкция, или, например, будет использован специфический </a:t>
+            </a:r>
+            <a:r>
+              <a:rPr lang="ru-RU" dirty="0" smtClean="0">
+                <a:solidFill>
+                  <a:sysClr val="windowText" lastClr="000000"/>
+                </a:solidFill>
+              </a:rPr>
+              <a:t>MMIO</a:t>
+            </a:r>
+          </a:p>
+          <a:p>
+            <a:pPr marL="342900" indent="-342900">
+              <a:buFont typeface="Arial" panose="020B0604020202020204" pitchFamily="34" charset="0"/>
+              <a:buChar char="•"/>
+            </a:pPr>
+            <a:endParaRPr lang="ru-RU" sz="2000" dirty="0">
+              <a:solidFill>
+                <a:sysClr val="windowText" lastClr="000000"/>
+              </a:solidFill>
+            </a:endParaRPr>
           </a:p>
           <a:p>
             <a:pPr marL="285750" indent="-285750">
               <a:buFont typeface="Arial" panose="020B0604020202020204" pitchFamily="34" charset="0"/>
               <a:buChar char="•"/>
             </a:pPr>
-            <a:endParaRPr lang="ru-RU" dirty="0"/>
+            <a:r>
+              <a:rPr lang="ru-RU" dirty="0" smtClean="0">
+                <a:solidFill>
+                  <a:sysClr val="windowText" lastClr="000000"/>
+                </a:solidFill>
+              </a:rPr>
+              <a:t>Больше не </a:t>
+            </a:r>
+            <a:r>
+              <a:rPr lang="ru-RU" dirty="0">
+                <a:solidFill>
+                  <a:sysClr val="windowText" lastClr="000000"/>
+                </a:solidFill>
+              </a:rPr>
+              <a:t>поддерживается, последняя версия </a:t>
+            </a:r>
+            <a:r>
+              <a:rPr lang="ru-RU" dirty="0" err="1">
+                <a:solidFill>
+                  <a:sysClr val="windowText" lastClr="000000"/>
+                </a:solidFill>
+              </a:rPr>
+              <a:t>afl</a:t>
+            </a:r>
+            <a:r>
+              <a:rPr lang="ru-RU" dirty="0">
+                <a:solidFill>
+                  <a:sysClr val="windowText" lastClr="000000"/>
+                </a:solidFill>
+              </a:rPr>
+              <a:t> в нем </a:t>
+            </a:r>
+            <a:r>
+              <a:rPr lang="ru-RU" dirty="0" smtClean="0">
+                <a:solidFill>
+                  <a:sysClr val="windowText" lastClr="000000"/>
+                </a:solidFill>
+              </a:rPr>
+              <a:t>2.06b</a:t>
+            </a:r>
+            <a:r>
+              <a:rPr lang="en-US" dirty="0" smtClean="0">
+                <a:solidFill>
+                  <a:sysClr val="windowText" lastClr="000000"/>
+                </a:solidFill>
+              </a:rPr>
+              <a:t>, </a:t>
+            </a:r>
+            <a:r>
+              <a:rPr lang="en-US" dirty="0" err="1" smtClean="0">
+                <a:solidFill>
+                  <a:sysClr val="windowText" lastClr="000000"/>
+                </a:solidFill>
+              </a:rPr>
+              <a:t>quemu</a:t>
+            </a:r>
+            <a:r>
+              <a:rPr lang="en-US" dirty="0" smtClean="0">
+                <a:solidFill>
+                  <a:sysClr val="windowText" lastClr="000000"/>
+                </a:solidFill>
+              </a:rPr>
+              <a:t> 2.3</a:t>
+            </a:r>
+            <a:endParaRPr lang="ru-RU" dirty="0" smtClean="0">
+              <a:solidFill>
+                <a:sysClr val="windowText" lastClr="000000"/>
+              </a:solidFill>
+            </a:endParaRPr>
+          </a:p>
+          <a:p>
+            <a:pPr marL="342900" indent="-342900">
+              <a:buFont typeface="Arial" panose="020B0604020202020204" pitchFamily="34" charset="0"/>
+              <a:buChar char="•"/>
+            </a:pPr>
+            <a:endParaRPr lang="ru-RU" sz="2000" dirty="0">
+              <a:solidFill>
+                <a:sysClr val="windowText" lastClr="000000"/>
+              </a:solidFill>
+            </a:endParaRPr>
           </a:p>
           <a:p>
             <a:pPr marL="285750" indent="-285750">
@@ -18621,49 +19600,153 @@
               <a:buChar char="•"/>
             </a:pPr>
             <a:r>
-              <a:rPr lang="ru-RU" dirty="0" smtClean="0"/>
-              <a:t>Когда </a:t>
-            </a:r>
-            <a:r>
-              <a:rPr lang="ru-RU" dirty="0"/>
-              <a:t>цель </a:t>
-            </a:r>
-            <a:r>
-              <a:rPr lang="ru-RU" dirty="0" err="1"/>
-              <a:t>фаззится</a:t>
-            </a:r>
-            <a:r>
-              <a:rPr lang="ru-RU" dirty="0"/>
-              <a:t> в режиме </a:t>
-            </a:r>
-            <a:r>
-              <a:rPr lang="ru-RU" dirty="0" err="1"/>
-              <a:t>Intel</a:t>
-            </a:r>
-            <a:r>
-              <a:rPr lang="ru-RU" dirty="0"/>
-              <a:t> PT, она открывается в отладчике. Перед каждой итерацией отладчик включает трассировку </a:t>
-            </a:r>
-            <a:r>
-              <a:rPr lang="ru-RU" dirty="0" err="1"/>
-              <a:t>Intel</a:t>
-            </a:r>
-            <a:r>
-              <a:rPr lang="ru-RU" dirty="0"/>
-              <a:t> PT для целевого процесса, а после завершения итерации трассировка извлекается и анализируется, обновляя карту </a:t>
-            </a:r>
-            <a:r>
-              <a:rPr lang="ru-RU" dirty="0" smtClean="0"/>
-              <a:t>покрытия</a:t>
-            </a:r>
-            <a:endParaRPr lang="ru-RU" dirty="0"/>
+              <a:rPr lang="ru-RU" dirty="0" err="1">
+                <a:solidFill>
+                  <a:sysClr val="windowText" lastClr="000000"/>
+                </a:solidFill>
+              </a:rPr>
+              <a:t>Ф</a:t>
+            </a:r>
+            <a:r>
+              <a:rPr lang="ru-RU" dirty="0" err="1" smtClean="0">
+                <a:solidFill>
+                  <a:sysClr val="windowText" lastClr="000000"/>
+                </a:solidFill>
+              </a:rPr>
+              <a:t>аззинг</a:t>
+            </a:r>
+            <a:r>
+              <a:rPr lang="ru-RU" dirty="0" smtClean="0">
+                <a:solidFill>
+                  <a:sysClr val="windowText" lastClr="000000"/>
+                </a:solidFill>
+              </a:rPr>
+              <a:t> </a:t>
+            </a:r>
+            <a:r>
+              <a:rPr lang="ru-RU" dirty="0">
+                <a:solidFill>
+                  <a:sysClr val="windowText" lastClr="000000"/>
+                </a:solidFill>
+              </a:rPr>
+              <a:t>выполняется </a:t>
+            </a:r>
+            <a:r>
+              <a:rPr lang="ru-RU" dirty="0" smtClean="0">
+                <a:solidFill>
+                  <a:sysClr val="windowText" lastClr="000000"/>
+                </a:solidFill>
+              </a:rPr>
+              <a:t>в RAM-памяти</a:t>
+            </a:r>
+            <a:r>
+              <a:rPr lang="ru-RU" dirty="0">
+                <a:solidFill>
+                  <a:sysClr val="windowText" lastClr="000000"/>
+                </a:solidFill>
+              </a:rPr>
+              <a:t>, на каждом тестовом запуске гостевой системе недоступен жесткий диск, </a:t>
+            </a:r>
+            <a:r>
+              <a:rPr lang="ru-RU" dirty="0" smtClean="0">
+                <a:solidFill>
+                  <a:sysClr val="windowText" lastClr="000000"/>
+                </a:solidFill>
+              </a:rPr>
+              <a:t>что годится </a:t>
+            </a:r>
+            <a:r>
+              <a:rPr lang="ru-RU" dirty="0">
+                <a:solidFill>
+                  <a:sysClr val="windowText" lastClr="000000"/>
+                </a:solidFill>
+              </a:rPr>
+              <a:t>для </a:t>
+            </a:r>
+            <a:r>
+              <a:rPr lang="ru-RU" dirty="0" err="1">
+                <a:solidFill>
+                  <a:sysClr val="windowText" lastClr="000000"/>
+                </a:solidFill>
+              </a:rPr>
+              <a:t>фаззинга</a:t>
+            </a:r>
+            <a:r>
+              <a:rPr lang="ru-RU" dirty="0">
+                <a:solidFill>
+                  <a:sysClr val="windowText" lastClr="000000"/>
+                </a:solidFill>
+              </a:rPr>
+              <a:t> ядра, но может существенно повлиять на достоверность </a:t>
+            </a:r>
+            <a:r>
+              <a:rPr lang="ru-RU" dirty="0" smtClean="0">
+                <a:solidFill>
+                  <a:sysClr val="windowText" lastClr="000000"/>
+                </a:solidFill>
+              </a:rPr>
+              <a:t>результатов </a:t>
+            </a:r>
+            <a:r>
+              <a:rPr lang="ru-RU" dirty="0" err="1" smtClean="0">
+                <a:solidFill>
+                  <a:sysClr val="windowText" lastClr="000000"/>
+                </a:solidFill>
+              </a:rPr>
+              <a:t>фаззинга</a:t>
+            </a:r>
+            <a:r>
+              <a:rPr lang="ru-RU" dirty="0" smtClean="0">
+                <a:solidFill>
+                  <a:sysClr val="windowText" lastClr="000000"/>
+                </a:solidFill>
+              </a:rPr>
+              <a:t> </a:t>
+            </a:r>
+            <a:r>
+              <a:rPr lang="ru-RU" dirty="0">
+                <a:solidFill>
+                  <a:sysClr val="windowText" lastClr="000000"/>
+                </a:solidFill>
+              </a:rPr>
+              <a:t>в случае использования указанного подхода к </a:t>
+            </a:r>
+            <a:r>
+              <a:rPr lang="ru-RU" dirty="0" err="1">
+                <a:solidFill>
+                  <a:sysClr val="windowText" lastClr="000000"/>
+                </a:solidFill>
+              </a:rPr>
+              <a:t>фаззингу</a:t>
+            </a:r>
+            <a:r>
+              <a:rPr lang="ru-RU" dirty="0">
+                <a:solidFill>
+                  <a:sysClr val="windowText" lastClr="000000"/>
+                </a:solidFill>
+              </a:rPr>
+              <a:t> </a:t>
+            </a:r>
+            <a:r>
+              <a:rPr lang="ru-RU" dirty="0" smtClean="0">
+                <a:solidFill>
+                  <a:sysClr val="windowText" lastClr="000000"/>
+                </a:solidFill>
+              </a:rPr>
+              <a:t>пользовательского кода</a:t>
+            </a:r>
+            <a:endParaRPr lang="ru-RU" sz="2000" dirty="0">
+              <a:solidFill>
+                <a:sysClr val="windowText" lastClr="000000"/>
+              </a:solidFill>
+            </a:endParaRPr>
           </a:p>
         </p:txBody>
       </p:sp>
     </p:spTree>
     <p:extLst>
       <p:ext uri="{BB962C8B-B14F-4D97-AF65-F5344CB8AC3E}">
-        <p14:creationId xmlns:p14="http://schemas.microsoft.com/office/powerpoint/2010/main" val="3595810813"/>
+        <p14:creationId xmlns:p14="http://schemas.microsoft.com/office/powerpoint/2010/main" val="3644889408"/>
       </p:ext>
     </p:extLst>
   </p:cSld>
@@ -18719,8 +19802,8 @@
           <a:lstStyle/>
           <a:p>
             <a:r>
-              <a:rPr lang="ru-RU" dirty="0" smtClean="0"/>
-              <a:t>ЗАГОЛОВОК</a:t>
+              <a:rPr lang="en-US" dirty="0" smtClean="0"/>
+              <a:t>EMBEDDED LINUX FUZZ</a:t>
             </a:r>
             <a:endParaRPr lang="ru-RU" dirty="0"/>
           </a:p>
@@ -18767,8 +19850,8 @@
         </p:nvSpPr>
         <p:spPr>
           <a:xfrm>
-            <a:off x="1820525" y="2303875"/>
-            <a:ext cx="3375375" cy="2835315"/>
+            <a:off x="1177070" y="6316079"/>
+            <a:ext cx="8505945" cy="523220"/>
           </a:xfrm>
           <a:prstGeom prst="rect">
             <a:avLst/>
@@ -18781,14 +19864,280 @@
           </a:bodyPr>
           <a:lstStyle/>
           <a:p>
+            <a:pPr algn="just"/>
+            <a:r>
+              <a:rPr lang="ru-RU" sz="1400" dirty="0">
+                <a:solidFill>
+                  <a:sysClr val="windowText" lastClr="000000"/>
+                </a:solidFill>
+              </a:rPr>
+              <a:t>Коваленко Р.Д., Макаров А.Н. Динамический анализ </a:t>
+            </a:r>
+            <a:r>
+              <a:rPr lang="ru-RU" sz="1400" dirty="0" err="1">
+                <a:solidFill>
+                  <a:sysClr val="windowText" lastClr="000000"/>
+                </a:solidFill>
+              </a:rPr>
+              <a:t>IoT</a:t>
+            </a:r>
+            <a:r>
+              <a:rPr lang="ru-RU" sz="1400" dirty="0">
+                <a:solidFill>
+                  <a:sysClr val="windowText" lastClr="000000"/>
+                </a:solidFill>
+              </a:rPr>
+              <a:t>-систем на </a:t>
+            </a:r>
+            <a:r>
+              <a:rPr lang="ru-RU" sz="1400" dirty="0" smtClean="0">
+                <a:solidFill>
+                  <a:sysClr val="windowText" lastClr="000000"/>
+                </a:solidFill>
+              </a:rPr>
+              <a:t>основе</a:t>
+            </a:r>
+            <a:r>
+              <a:rPr lang="en-US" sz="1400" dirty="0" smtClean="0">
+                <a:solidFill>
+                  <a:sysClr val="windowText" lastClr="000000"/>
+                </a:solidFill>
+              </a:rPr>
+              <a:t> </a:t>
+            </a:r>
+            <a:r>
+              <a:rPr lang="ru-RU" sz="1400" dirty="0" smtClean="0">
+                <a:solidFill>
+                  <a:sysClr val="windowText" lastClr="000000"/>
+                </a:solidFill>
+              </a:rPr>
+              <a:t>полносистемной </a:t>
+            </a:r>
+            <a:r>
+              <a:rPr lang="ru-RU" sz="1400" dirty="0">
+                <a:solidFill>
+                  <a:sysClr val="windowText" lastClr="000000"/>
+                </a:solidFill>
+              </a:rPr>
+              <a:t>эмуляции в QEMU. Труды ИСП РАН, том 33, </a:t>
+            </a:r>
+            <a:r>
+              <a:rPr lang="ru-RU" sz="1400" dirty="0" err="1">
+                <a:solidFill>
+                  <a:sysClr val="windowText" lastClr="000000"/>
+                </a:solidFill>
+              </a:rPr>
+              <a:t>вып</a:t>
+            </a:r>
+            <a:r>
+              <a:rPr lang="ru-RU" sz="1400" dirty="0">
+                <a:solidFill>
+                  <a:sysClr val="windowText" lastClr="000000"/>
+                </a:solidFill>
+              </a:rPr>
+              <a:t>. 5, 2021 г., стр. 155-166. DOI</a:t>
+            </a:r>
+            <a:r>
+              <a:rPr lang="ru-RU" sz="1400" dirty="0" smtClean="0">
+                <a:solidFill>
+                  <a:sysClr val="windowText" lastClr="000000"/>
+                </a:solidFill>
+              </a:rPr>
+              <a:t>:</a:t>
+            </a:r>
+            <a:r>
+              <a:rPr lang="en-US" sz="1400" dirty="0" smtClean="0">
+                <a:solidFill>
+                  <a:sysClr val="windowText" lastClr="000000"/>
+                </a:solidFill>
+              </a:rPr>
+              <a:t> 10.15514/ISPRAS–2021–33(5)–9</a:t>
+            </a:r>
+            <a:endParaRPr lang="ru-RU" sz="1400" dirty="0">
+              <a:solidFill>
+                <a:sysClr val="windowText" lastClr="000000"/>
+              </a:solidFill>
+            </a:endParaRPr>
+          </a:p>
+        </p:txBody>
+      </p:sp>
+      <p:sp>
+        <p:nvSpPr>
+          <p:cNvPr id="5" name="TextBox 4"/>
+          <p:cNvSpPr txBox="1"/>
+          <p:nvPr/>
+        </p:nvSpPr>
+        <p:spPr>
+          <a:xfrm>
+            <a:off x="442912" y="1382939"/>
+            <a:ext cx="9478513" cy="4247317"/>
+          </a:xfrm>
+          <a:prstGeom prst="rect">
+            <a:avLst/>
+          </a:prstGeom>
+          <a:noFill/>
+        </p:spPr>
+        <p:txBody>
+          <a:bodyPr wrap="square" rtlCol="0">
+            <a:spAutoFit/>
+          </a:bodyPr>
+          <a:lstStyle/>
+          <a:p>
+            <a:pPr marL="285750" indent="-285750">
+              <a:buFont typeface="Segoe UI" panose="020B0502040204020203" pitchFamily="34" charset="0"/>
+              <a:buChar char="+"/>
+            </a:pPr>
+            <a:r>
+              <a:rPr lang="kk-KZ" dirty="0" smtClean="0"/>
+              <a:t>Основан на </a:t>
+            </a:r>
+            <a:r>
+              <a:rPr lang="en-US" dirty="0" err="1" smtClean="0"/>
+              <a:t>TriforceAFL</a:t>
+            </a:r>
+            <a:r>
+              <a:rPr lang="ru-RU" dirty="0" smtClean="0"/>
+              <a:t>, но расширяет тестовое окружение и предоставляет примеры и инструменты для тестирования настроенной системы перед началом </a:t>
+            </a:r>
+            <a:r>
+              <a:rPr lang="ru-RU" dirty="0" err="1" smtClean="0"/>
+              <a:t>фаззинга</a:t>
+            </a:r>
+            <a:endParaRPr lang="en-US" dirty="0" smtClean="0"/>
+          </a:p>
+          <a:p>
+            <a:pPr marL="285750" indent="-285750">
+              <a:buFont typeface="Segoe UI" panose="020B0502040204020203" pitchFamily="34" charset="0"/>
+              <a:buChar char="+"/>
+            </a:pPr>
+            <a:endParaRPr lang="en-US" dirty="0"/>
+          </a:p>
+          <a:p>
+            <a:pPr marL="285750" indent="-285750">
+              <a:buFont typeface="Segoe UI" panose="020B0502040204020203" pitchFamily="34" charset="0"/>
+              <a:buChar char="+"/>
+            </a:pPr>
+            <a:r>
+              <a:rPr lang="ru-RU" dirty="0" smtClean="0"/>
+              <a:t>Добавляет к отчету о </a:t>
+            </a:r>
+            <a:r>
+              <a:rPr lang="ru-RU" dirty="0" err="1" smtClean="0"/>
+              <a:t>фаззинге</a:t>
+            </a:r>
+            <a:r>
+              <a:rPr lang="ru-RU" dirty="0" smtClean="0"/>
+              <a:t> некоторые данные о покрытии</a:t>
+            </a:r>
+          </a:p>
+          <a:p>
+            <a:pPr marL="285750" indent="-285750">
+              <a:buFont typeface="Segoe UI" panose="020B0502040204020203" pitchFamily="34" charset="0"/>
+              <a:buChar char="+"/>
+            </a:pPr>
             <a:endParaRPr lang="ru-RU" dirty="0"/>
+          </a:p>
+          <a:p>
+            <a:pPr marL="285750" indent="-285750">
+              <a:buFont typeface="Segoe UI" panose="020B0502040204020203" pitchFamily="34" charset="0"/>
+              <a:buChar char="+"/>
+            </a:pPr>
+            <a:r>
+              <a:rPr lang="ru-RU" dirty="0" smtClean="0"/>
+              <a:t>Позволяет </a:t>
+            </a:r>
+            <a:r>
+              <a:rPr lang="ru-RU" dirty="0" err="1" smtClean="0"/>
+              <a:t>фаззить</a:t>
+            </a:r>
+            <a:r>
+              <a:rPr lang="ru-RU" dirty="0" smtClean="0"/>
+              <a:t> любые исполняемые файлы внутри виртуальной машины</a:t>
+            </a:r>
+          </a:p>
+          <a:p>
+            <a:endParaRPr lang="ru-RU" dirty="0"/>
+          </a:p>
+          <a:p>
+            <a:pPr marL="285750" indent="-285750">
+              <a:buFont typeface="Segoe UI" panose="020B0502040204020203" pitchFamily="34" charset="0"/>
+              <a:buChar char="‑"/>
+            </a:pPr>
+            <a:r>
+              <a:rPr lang="ru-RU" dirty="0" smtClean="0"/>
+              <a:t>Все еще привязан к ядру </a:t>
+            </a:r>
+            <a:r>
+              <a:rPr lang="en-US" dirty="0" smtClean="0"/>
+              <a:t>Linux</a:t>
+            </a:r>
+          </a:p>
+          <a:p>
+            <a:pPr marL="285750" indent="-285750">
+              <a:buFont typeface="Segoe UI" panose="020B0502040204020203" pitchFamily="34" charset="0"/>
+              <a:buChar char="‑"/>
+            </a:pPr>
+            <a:endParaRPr lang="en-US" dirty="0"/>
+          </a:p>
+          <a:p>
+            <a:pPr marL="285750" indent="-285750">
+              <a:buFont typeface="Segoe UI" panose="020B0502040204020203" pitchFamily="34" charset="0"/>
+              <a:buChar char="‑"/>
+            </a:pPr>
+            <a:r>
+              <a:rPr lang="ru-RU" dirty="0" err="1" smtClean="0"/>
+              <a:t>Проприетарный</a:t>
+            </a:r>
+            <a:r>
+              <a:rPr lang="ru-RU" dirty="0" smtClean="0"/>
+              <a:t> проект с закрытым исходным кодом</a:t>
+            </a:r>
+          </a:p>
+          <a:p>
+            <a:endParaRPr lang="ru-RU" dirty="0"/>
+          </a:p>
+          <a:p>
+            <a:pPr marL="285750" indent="-285750">
+              <a:buFont typeface="Arial" panose="020B0604020202020204" pitchFamily="34" charset="0"/>
+              <a:buChar char="•"/>
+            </a:pPr>
+            <a:r>
+              <a:rPr lang="ru-RU" dirty="0" smtClean="0"/>
+              <a:t>Дает понять, что при некоторых усилиях от </a:t>
+            </a:r>
+            <a:r>
+              <a:rPr lang="en-US" dirty="0" err="1" smtClean="0"/>
+              <a:t>TriforceAFL</a:t>
+            </a:r>
+            <a:r>
+              <a:rPr lang="ru-RU" dirty="0" smtClean="0"/>
+              <a:t> можно получить более подробные результаты</a:t>
+            </a:r>
+          </a:p>
+          <a:p>
+            <a:pPr marL="285750" indent="-285750">
+              <a:buFont typeface="Arial" panose="020B0604020202020204" pitchFamily="34" charset="0"/>
+              <a:buChar char="•"/>
+            </a:pPr>
+            <a:endParaRPr lang="ru-RU" dirty="0"/>
+          </a:p>
+          <a:p>
+            <a:pPr marL="285750" indent="-285750">
+              <a:buFont typeface="Arial" panose="020B0604020202020204" pitchFamily="34" charset="0"/>
+              <a:buChar char="•"/>
+            </a:pPr>
+            <a:r>
+              <a:rPr lang="ru-RU" dirty="0" smtClean="0"/>
+              <a:t>Но можно ли лучше?</a:t>
+            </a:r>
+            <a:endParaRPr lang="en-US" dirty="0"/>
           </a:p>
         </p:txBody>
       </p:sp>
     </p:spTree>
     <p:extLst>
       <p:ext uri="{BB962C8B-B14F-4D97-AF65-F5344CB8AC3E}">
-        <p14:creationId xmlns:p14="http://schemas.microsoft.com/office/powerpoint/2010/main" val="1741556976"/>
+        <p14:creationId xmlns:p14="http://schemas.microsoft.com/office/powerpoint/2010/main" val="1794853979"/>
       </p:ext>
     </p:extLst>
   </p:cSld>

</xml_diff>